<commit_message>
Added changes to kraken presentation from Robert.
</commit_message>
<xml_diff>
--- a/node/lesson-80-kraken/kraken.pptx
+++ b/node/lesson-80-kraken/kraken.pptx
@@ -47,7 +47,7 @@
   <p:sldSz cx="9144000" cy="6858000" type="screen4x3"/>
   <p:notesSz cx="6858000" cy="9144000"/>
   <p:custDataLst>
-    <p:tags r:id="rId37"/>
+    <p:tags r:id="rId36"/>
   </p:custDataLst>
   <p:defaultTextStyle>
     <a:defPPr>
@@ -150,6 +150,7 @@
 <file path=ppt/commentAuthors.xml><?xml version="1.0" encoding="utf-8"?>
 <p:cmAuthorLst xmlns:a="http://schemas.openxmlformats.org/drawingml/2006/main" xmlns:r="http://schemas.openxmlformats.org/officeDocument/2006/relationships" xmlns:p="http://schemas.openxmlformats.org/presentationml/2006/main">
   <p:cmAuthor id="0" name="Piyush, Pranav" initials="PP" lastIdx="1" clrIdx="0"/>
+  <p:cmAuthor id="1" name="Robert Streich" initials="" lastIdx="0" clrIdx="1"/>
 </p:cmAuthorLst>
 </file>
 
@@ -1247,7 +1248,7 @@
   <p:timing>
     <p:tnLst>
       <p:par>
-        <p:cTn xmlns:p14="http://schemas.microsoft.com/office/powerpoint/2010/main" id="1" dur="indefinite" restart="never" nodeType="tmRoot"/>
+        <p:cTn id="1" dur="indefinite" restart="never" nodeType="tmRoot"/>
       </p:par>
     </p:tnLst>
   </p:timing>
@@ -1302,7 +1303,7 @@
           </a:prstGeom>
           <a:noFill/>
           <a:extLst>
-            <a:ext uri="{909E8E84-426E-40dd-AFC4-6F175D3DCCD1}">
+            <a:ext uri="{909E8E84-426E-40DD-AFC4-6F175D3DCCD1}">
               <a14:hiddenFill xmlns:a14="http://schemas.microsoft.com/office/drawing/2010/main">
                 <a:solidFill>
                   <a:srgbClr val="FFFFFF"/>
@@ -1458,7 +1459,7 @@
   <p:timing>
     <p:tnLst>
       <p:par>
-        <p:cTn xmlns:p14="http://schemas.microsoft.com/office/powerpoint/2010/main" id="1" dur="indefinite" restart="never" nodeType="tmRoot"/>
+        <p:cTn id="1" dur="indefinite" restart="never" nodeType="tmRoot"/>
       </p:par>
     </p:tnLst>
   </p:timing>
@@ -1913,7 +1914,7 @@
   <p:timing>
     <p:tnLst>
       <p:par>
-        <p:cTn xmlns:p14="http://schemas.microsoft.com/office/powerpoint/2010/main" id="1" dur="indefinite" restart="never" nodeType="tmRoot"/>
+        <p:cTn id="1" dur="indefinite" restart="never" nodeType="tmRoot"/>
       </p:par>
     </p:tnLst>
   </p:timing>
@@ -2253,7 +2254,7 @@
   <p:timing>
     <p:tnLst>
       <p:par>
-        <p:cTn xmlns:p14="http://schemas.microsoft.com/office/powerpoint/2010/main" id="1" dur="indefinite" restart="never" nodeType="tmRoot"/>
+        <p:cTn id="1" dur="indefinite" restart="never" nodeType="tmRoot"/>
       </p:par>
     </p:tnLst>
   </p:timing>
@@ -2741,7 +2742,7 @@
   <p:timing>
     <p:tnLst>
       <p:par>
-        <p:cTn xmlns:p14="http://schemas.microsoft.com/office/powerpoint/2010/main" id="1" dur="indefinite" restart="never" nodeType="tmRoot"/>
+        <p:cTn id="1" dur="indefinite" restart="never" nodeType="tmRoot"/>
       </p:par>
     </p:tnLst>
   </p:timing>
@@ -3104,7 +3105,7 @@
   <p:timing>
     <p:tnLst>
       <p:par>
-        <p:cTn xmlns:p14="http://schemas.microsoft.com/office/powerpoint/2010/main" id="1" dur="indefinite" restart="never" nodeType="tmRoot"/>
+        <p:cTn id="1" dur="indefinite" restart="never" nodeType="tmRoot"/>
       </p:par>
     </p:tnLst>
   </p:timing>
@@ -3694,7 +3695,7 @@
   <p:timing>
     <p:tnLst>
       <p:par>
-        <p:cTn xmlns:p14="http://schemas.microsoft.com/office/powerpoint/2010/main" id="1" dur="indefinite" restart="never" nodeType="tmRoot"/>
+        <p:cTn id="1" dur="indefinite" restart="never" nodeType="tmRoot"/>
       </p:par>
     </p:tnLst>
   </p:timing>
@@ -3957,7 +3958,7 @@
   <p:timing>
     <p:tnLst>
       <p:par>
-        <p:cTn xmlns:p14="http://schemas.microsoft.com/office/powerpoint/2010/main" id="1" dur="indefinite" restart="never" nodeType="tmRoot"/>
+        <p:cTn id="1" dur="indefinite" restart="never" nodeType="tmRoot"/>
       </p:par>
     </p:tnLst>
   </p:timing>
@@ -4304,7 +4305,7 @@
   <p:timing>
     <p:tnLst>
       <p:par>
-        <p:cTn xmlns:p14="http://schemas.microsoft.com/office/powerpoint/2010/main" id="1" dur="indefinite" restart="never" nodeType="tmRoot"/>
+        <p:cTn id="1" dur="indefinite" restart="never" nodeType="tmRoot"/>
       </p:par>
     </p:tnLst>
   </p:timing>
@@ -4530,7 +4531,7 @@
   <p:timing>
     <p:tnLst>
       <p:par>
-        <p:cTn xmlns:p14="http://schemas.microsoft.com/office/powerpoint/2010/main" id="1" dur="indefinite" restart="never" nodeType="tmRoot"/>
+        <p:cTn id="1" dur="indefinite" restart="never" nodeType="tmRoot"/>
       </p:par>
     </p:tnLst>
   </p:timing>
@@ -5096,7 +5097,7 @@
   <p:timing>
     <p:tnLst>
       <p:par>
-        <p:cTn xmlns:p14="http://schemas.microsoft.com/office/powerpoint/2010/main" id="1" dur="indefinite" restart="never" nodeType="tmRoot"/>
+        <p:cTn id="1" dur="indefinite" restart="never" nodeType="tmRoot"/>
       </p:par>
     </p:tnLst>
   </p:timing>
@@ -5237,7 +5238,7 @@
   <p:timing>
     <p:tnLst>
       <p:par>
-        <p:cTn xmlns:p14="http://schemas.microsoft.com/office/powerpoint/2010/main" id="1" dur="indefinite" restart="never" nodeType="tmRoot"/>
+        <p:cTn id="1" dur="indefinite" restart="never" nodeType="tmRoot"/>
       </p:par>
     </p:tnLst>
   </p:timing>
@@ -5895,7 +5896,7 @@
   <p:timing>
     <p:tnLst>
       <p:par>
-        <p:cTn xmlns:p14="http://schemas.microsoft.com/office/powerpoint/2010/main" id="1" dur="indefinite" restart="never" nodeType="tmRoot"/>
+        <p:cTn id="1" dur="indefinite" restart="never" nodeType="tmRoot"/>
       </p:par>
     </p:tnLst>
   </p:timing>
@@ -6109,7 +6110,7 @@
   <p:timing>
     <p:tnLst>
       <p:par>
-        <p:cTn xmlns:p14="http://schemas.microsoft.com/office/powerpoint/2010/main" id="1" dur="indefinite" restart="never" nodeType="tmRoot"/>
+        <p:cTn id="1" dur="indefinite" restart="never" nodeType="tmRoot"/>
       </p:par>
     </p:tnLst>
   </p:timing>
@@ -6291,7 +6292,7 @@
   <p:timing>
     <p:tnLst>
       <p:par>
-        <p:cTn xmlns:p14="http://schemas.microsoft.com/office/powerpoint/2010/main" id="1" dur="indefinite" restart="never" nodeType="tmRoot"/>
+        <p:cTn id="1" dur="indefinite" restart="never" nodeType="tmRoot"/>
       </p:par>
     </p:tnLst>
   </p:timing>
@@ -6953,7 +6954,7 @@
   <p:timing>
     <p:tnLst>
       <p:par>
-        <p:cTn xmlns:p14="http://schemas.microsoft.com/office/powerpoint/2010/main" id="1" dur="indefinite" restart="never" nodeType="tmRoot"/>
+        <p:cTn id="1" dur="indefinite" restart="never" nodeType="tmRoot"/>
       </p:par>
     </p:tnLst>
   </p:timing>
@@ -7155,7 +7156,7 @@
   <p:timing>
     <p:tnLst>
       <p:par>
-        <p:cTn xmlns:p14="http://schemas.microsoft.com/office/powerpoint/2010/main" id="1" dur="indefinite" restart="never" nodeType="tmRoot"/>
+        <p:cTn id="1" dur="indefinite" restart="never" nodeType="tmRoot"/>
       </p:par>
     </p:tnLst>
   </p:timing>
@@ -7359,7 +7360,7 @@
   <p:timing>
     <p:tnLst>
       <p:par>
-        <p:cTn xmlns:p14="http://schemas.microsoft.com/office/powerpoint/2010/main" id="1" dur="indefinite" restart="never" nodeType="tmRoot"/>
+        <p:cTn id="1" dur="indefinite" restart="never" nodeType="tmRoot"/>
       </p:par>
     </p:tnLst>
   </p:timing>
@@ -8142,7 +8143,7 @@
   <p:timing>
     <p:tnLst>
       <p:par>
-        <p:cTn xmlns:p14="http://schemas.microsoft.com/office/powerpoint/2010/main" id="1" dur="indefinite" restart="never" nodeType="tmRoot"/>
+        <p:cTn id="1" dur="indefinite" restart="never" nodeType="tmRoot"/>
       </p:par>
     </p:tnLst>
   </p:timing>
@@ -8578,7 +8579,7 @@
   <p:timing>
     <p:tnLst>
       <p:par>
-        <p:cTn xmlns:p14="http://schemas.microsoft.com/office/powerpoint/2010/main" id="1" dur="indefinite" restart="never" nodeType="tmRoot"/>
+        <p:cTn id="1" dur="indefinite" restart="never" nodeType="tmRoot"/>
       </p:par>
     </p:tnLst>
   </p:timing>
@@ -8965,7 +8966,7 @@
   <p:timing>
     <p:tnLst>
       <p:par>
-        <p:cTn xmlns:p14="http://schemas.microsoft.com/office/powerpoint/2010/main" id="1" dur="indefinite" restart="never" nodeType="tmRoot"/>
+        <p:cTn id="1" dur="indefinite" restart="never" nodeType="tmRoot"/>
       </p:par>
     </p:tnLst>
   </p:timing>
@@ -9290,7 +9291,7 @@
   <p:timing>
     <p:tnLst>
       <p:par>
-        <p:cTn xmlns:p14="http://schemas.microsoft.com/office/powerpoint/2010/main" id="1" dur="indefinite" restart="never" nodeType="tmRoot"/>
+        <p:cTn id="1" dur="indefinite" restart="never" nodeType="tmRoot"/>
       </p:par>
     </p:tnLst>
   </p:timing>
@@ -9956,7 +9957,7 @@
   <p:timing>
     <p:tnLst>
       <p:par>
-        <p:cTn xmlns:p14="http://schemas.microsoft.com/office/powerpoint/2010/main" id="1" dur="indefinite" restart="never" nodeType="tmRoot"/>
+        <p:cTn id="1" dur="indefinite" restart="never" nodeType="tmRoot"/>
       </p:par>
     </p:tnLst>
   </p:timing>
@@ -10486,7 +10487,7 @@
   <p:timing>
     <p:tnLst>
       <p:par>
-        <p:cTn xmlns:p14="http://schemas.microsoft.com/office/powerpoint/2010/main" id="1" dur="indefinite" restart="never" nodeType="tmRoot"/>
+        <p:cTn id="1" dur="indefinite" restart="never" nodeType="tmRoot"/>
       </p:par>
     </p:tnLst>
   </p:timing>
@@ -10703,7 +10704,7 @@
   <p:timing>
     <p:tnLst>
       <p:par>
-        <p:cTn xmlns:p14="http://schemas.microsoft.com/office/powerpoint/2010/main" id="1" dur="indefinite" restart="never" nodeType="tmRoot"/>
+        <p:cTn id="1" dur="indefinite" restart="never" nodeType="tmRoot"/>
       </p:par>
     </p:tnLst>
   </p:timing>
@@ -10907,7 +10908,7 @@
   <p:timing>
     <p:tnLst>
       <p:par>
-        <p:cTn xmlns:p14="http://schemas.microsoft.com/office/powerpoint/2010/main" id="1" dur="indefinite" restart="never" nodeType="tmRoot"/>
+        <p:cTn id="1" dur="indefinite" restart="never" nodeType="tmRoot"/>
       </p:par>
     </p:tnLst>
   </p:timing>
@@ -10947,84 +10948,119 @@
           <a:lstStyle/>
           <a:p>
             <a:r>
-              <a:rPr lang="en-US" dirty="0" smtClean="0"/>
+              <a:rPr lang="en-US" dirty="0"/>
               <a:t>The Kraken Engine-</a:t>
             </a:r>
             <a:r>
-              <a:rPr lang="en-US" dirty="0" err="1" smtClean="0"/>
+              <a:rPr lang="en-US" dirty="0" err="1"/>
               <a:t>munger</a:t>
             </a:r>
             <a:r>
-              <a:rPr lang="en-US" dirty="0" smtClean="0"/>
+              <a:rPr lang="en-US" dirty="0"/>
               <a:t> module is responsible for loading content bundles based on request context</a:t>
             </a:r>
           </a:p>
           <a:p>
             <a:r>
-              <a:rPr lang="en-US" dirty="0" smtClean="0"/>
+              <a:rPr lang="en-US" dirty="0"/>
               <a:t>Locality is set by assigning </a:t>
             </a:r>
             <a:r>
-              <a:rPr lang="en-US" sz="2000" dirty="0" err="1" smtClean="0">
+              <a:rPr lang="en-US" sz="2000" dirty="0" err="1">
                 <a:latin typeface="Monaco"/>
                 <a:cs typeface="Monaco"/>
               </a:rPr>
               <a:t>res.locals.context.locality</a:t>
             </a:r>
             <a:r>
-              <a:rPr lang="en-US" dirty="0" smtClean="0"/>
+              <a:rPr lang="en-US" dirty="0"/>
               <a:t> to the appropriate value before a route is executed</a:t>
             </a:r>
           </a:p>
           <a:p>
             <a:r>
-              <a:rPr lang="en-US" dirty="0" smtClean="0"/>
+              <a:rPr lang="en-US" dirty="0"/>
               <a:t>The {</a:t>
             </a:r>
             <a:r>
-              <a:rPr lang="en-US" sz="2000" dirty="0" smtClean="0">
-                <a:latin typeface="Monaco"/>
-                <a:cs typeface="Monaco"/>
-              </a:rPr>
-              <a:t>@</a:t>
-            </a:r>
-            <a:r>
               <a:rPr lang="en-US" sz="2000" dirty="0">
                 <a:latin typeface="Monaco"/>
                 <a:cs typeface="Monaco"/>
               </a:rPr>
-              <a:t>pre type="content</a:t>
-            </a:r>
-            <a:r>
-              <a:rPr lang="en-US" sz="2000" dirty="0" smtClean="0">
-                <a:latin typeface="Monaco"/>
-                <a:cs typeface="Monaco"/>
-              </a:rPr>
-              <a:t>"}</a:t>
-            </a:r>
-            <a:r>
-              <a:rPr lang="en-US" dirty="0" smtClean="0"/>
-              <a:t> tag is added to Dust templates to indicate Engine-</a:t>
-            </a:r>
-            <a:r>
-              <a:rPr lang="en-US" dirty="0" err="1" smtClean="0"/>
-              <a:t>munger</a:t>
-            </a:r>
-            <a:r>
-              <a:rPr lang="en-US" dirty="0" smtClean="0"/>
-              <a:t> should load a localized key from property bundle</a:t>
-            </a:r>
-          </a:p>
-          <a:p>
-            <a:r>
-              <a:rPr lang="en-US" dirty="0" smtClean="0"/>
+              <a:t>@pre type="content"}</a:t>
+            </a:r>
+            <a:r>
+              <a:rPr lang="en-US" dirty="0"/>
+              <a:t> tag </a:t>
+            </a:r>
+            <a:r>
+              <a:rPr lang="en-US"/>
+              <a:t>is </a:t>
+            </a:r>
+            <a:r>
+              <a:rPr lang="en-US" dirty="0"/>
+              <a:t>used</a:t>
+            </a:r>
+            <a:r>
+              <a:rPr lang="en-US"/>
+              <a:t> in dust </a:t>
+            </a:r>
+            <a:r>
+              <a:rPr lang="en-US" smtClean="0"/>
+              <a:t>templates </a:t>
+            </a:r>
+            <a:r>
+              <a:rPr lang="en-US"/>
+              <a:t>to </a:t>
+            </a:r>
+            <a:r>
+              <a:rPr lang="en-US"/>
+              <a:t>provide</a:t>
+            </a:r>
+            <a:r>
+              <a:rPr lang="en-US"/>
+              <a:t> </a:t>
+            </a:r>
+            <a:r>
+              <a:rPr lang="en-US" smtClean="0"/>
+              <a:t>localized </a:t>
+            </a:r>
+            <a:r>
+              <a:rPr lang="en-US" dirty="0"/>
+              <a:t>content</a:t>
+            </a:r>
+            <a:r>
+              <a:rPr lang="en-US"/>
+              <a:t> strings, inlined </a:t>
+            </a:r>
+            <a:r>
+              <a:rPr lang="en-US" smtClean="0"/>
+              <a:t>from </a:t>
+            </a:r>
+            <a:r>
+              <a:rPr lang="en-US" dirty="0"/>
+              <a:t>the</a:t>
+            </a:r>
+            <a:r>
+              <a:rPr lang="en-US"/>
+              <a:t> proper locale content </a:t>
+            </a:r>
+            <a:r>
+              <a:rPr lang="en-US" smtClean="0"/>
+              <a:t>bundle</a:t>
+            </a:r>
+            <a:endParaRPr lang="en-US" dirty="0"/>
+          </a:p>
+          <a:p>
+            <a:r>
+              <a:rPr lang="en-US" dirty="0"/>
               <a:t>Bundles are coupled to views</a:t>
             </a:r>
           </a:p>
           <a:p>
             <a:pPr lvl="1"/>
             <a:r>
-              <a:rPr lang="en-US" dirty="0" smtClean="0"/>
+              <a:rPr lang="en-US" dirty="0"/>
               <a:t>When generated with a view, they are expected to be in </a:t>
             </a:r>
             <a:r>
@@ -11032,66 +11068,44 @@
                 <a:latin typeface="Monaco"/>
                 <a:cs typeface="Monaco"/>
               </a:rPr>
-              <a:t>/locales/&lt;country&gt;/&lt;language&gt;</a:t>
-            </a:r>
-            <a:r>
-              <a:rPr lang="en-US" sz="1600" dirty="0" smtClean="0">
-                <a:latin typeface="Monaco"/>
-                <a:cs typeface="Monaco"/>
-              </a:rPr>
-              <a:t>/&lt;view&gt;/</a:t>
-            </a:r>
-            <a:r>
-              <a:rPr lang="en-US" sz="1600" dirty="0" err="1" smtClean="0">
+              <a:t>/locales/&lt;country&gt;/&lt;language&gt;/&lt;view&gt;/</a:t>
+            </a:r>
+            <a:r>
+              <a:rPr lang="en-US" sz="1600" dirty="0" err="1">
                 <a:latin typeface="Monaco"/>
                 <a:cs typeface="Monaco"/>
               </a:rPr>
               <a:t>index.properties</a:t>
-            </a:r>
-            <a:endParaRPr lang="en-US" sz="1600" dirty="0" smtClean="0">
-              <a:latin typeface="Monaco"/>
-              <a:cs typeface="Monaco"/>
-            </a:endParaRPr>
-          </a:p>
-          <a:p>
-            <a:pPr lvl="1"/>
-            <a:r>
-              <a:rPr lang="en-US" dirty="0"/>
-              <a:t>If you use the alternate naming for </a:t>
-            </a:r>
-            <a:r>
-              <a:rPr lang="en-US" dirty="0" smtClean="0"/>
-              <a:t>templates—</a:t>
-            </a:r>
-            <a:r>
-              <a:rPr lang="en-US" sz="1600" dirty="0" smtClean="0">
-                <a:latin typeface="Monaco"/>
-                <a:cs typeface="Monaco"/>
-              </a:rPr>
-              <a:t>&lt;view&gt;.dust</a:t>
-            </a:r>
-            <a:r>
-              <a:rPr lang="en-US" dirty="0" smtClean="0"/>
-              <a:t>—language bundles should be in </a:t>
-            </a:r>
-            <a:r>
-              <a:rPr lang="en-US" sz="1600" dirty="0">
-                <a:latin typeface="Monaco"/>
-                <a:cs typeface="Monaco"/>
-              </a:rPr>
-              <a:t>/locales/&lt;country&gt;/&lt;language&gt;/&lt;view</a:t>
-            </a:r>
-            <a:r>
-              <a:rPr lang="en-US" sz="1600" dirty="0" smtClean="0">
-                <a:latin typeface="Monaco"/>
-                <a:cs typeface="Monaco"/>
-              </a:rPr>
-              <a:t>&gt;.properties</a:t>
             </a:r>
             <a:endParaRPr lang="en-US" sz="1600" dirty="0">
               <a:latin typeface="Monaco"/>
               <a:cs typeface="Monaco"/>
             </a:endParaRPr>
+          </a:p>
+          <a:p>
+            <a:pPr lvl="1"/>
+            <a:r>
+              <a:rPr lang="en-US" dirty="0"/>
+              <a:t>If you use the alternate naming for templates—</a:t>
+            </a:r>
+            <a:r>
+              <a:rPr lang="en-US" sz="1600" dirty="0">
+                <a:latin typeface="Monaco"/>
+                <a:cs typeface="Monaco"/>
+              </a:rPr>
+              <a:t>&lt;view&gt;.dust</a:t>
+            </a:r>
+            <a:r>
+              <a:rPr lang="en-US" dirty="0"/>
+              <a:t>—language bundles should be in </a:t>
+            </a:r>
+            <a:r>
+              <a:rPr lang="en-US" sz="1600" dirty="0">
+                <a:latin typeface="Monaco"/>
+                <a:cs typeface="Monaco"/>
+              </a:rPr>
+              <a:t>/locales/&lt;country&gt;/&lt;language&gt;/&lt;view&gt;.properties</a:t>
+            </a:r>
           </a:p>
         </p:txBody>
       </p:sp>
@@ -11171,7 +11185,7 @@
   <p:timing>
     <p:tnLst>
       <p:par>
-        <p:cTn xmlns:p14="http://schemas.microsoft.com/office/powerpoint/2010/main" id="1" dur="indefinite" restart="never" nodeType="tmRoot"/>
+        <p:cTn id="1" dur="indefinite" restart="never" nodeType="tmRoot"/>
       </p:par>
     </p:tnLst>
   </p:timing>
@@ -11280,15 +11294,7 @@
             </a:r>
             <a:r>
               <a:rPr lang="en-US" dirty="0" smtClean="0"/>
-              <a:t> a framework in itself but </a:t>
-            </a:r>
-            <a:r>
-              <a:rPr lang="en-US" dirty="0" smtClean="0"/>
-              <a:t>a complement to </a:t>
-            </a:r>
-            <a:r>
-              <a:rPr lang="en-US" dirty="0" smtClean="0"/>
-              <a:t>Express</a:t>
+              <a:t> a framework in itself but a complement to Express</a:t>
             </a:r>
           </a:p>
         </p:txBody>
@@ -11369,7 +11375,7 @@
   <p:timing>
     <p:tnLst>
       <p:par>
-        <p:cTn xmlns:p14="http://schemas.microsoft.com/office/powerpoint/2010/main" id="1" dur="indefinite" restart="never" nodeType="tmRoot"/>
+        <p:cTn id="1" dur="indefinite" restart="never" nodeType="tmRoot"/>
       </p:par>
     </p:tnLst>
   </p:timing>
@@ -11762,7 +11768,7 @@
   <p:timing>
     <p:tnLst>
       <p:par>
-        <p:cTn xmlns:p14="http://schemas.microsoft.com/office/powerpoint/2010/main" id="1" dur="indefinite" restart="never" nodeType="tmRoot"/>
+        <p:cTn id="1" dur="indefinite" restart="never" nodeType="tmRoot"/>
       </p:par>
     </p:tnLst>
   </p:timing>
@@ -11969,7 +11975,7 @@
   <p:timing>
     <p:tnLst>
       <p:par>
-        <p:cTn xmlns:p14="http://schemas.microsoft.com/office/powerpoint/2010/main" id="1" dur="indefinite" restart="never" nodeType="tmRoot"/>
+        <p:cTn id="1" dur="indefinite" restart="never" nodeType="tmRoot"/>
       </p:par>
     </p:tnLst>
   </p:timing>
@@ -12009,154 +12015,163 @@
           <a:lstStyle/>
           <a:p>
             <a:r>
-              <a:rPr lang="en-US" sz="2000" dirty="0" smtClean="0"/>
+              <a:rPr lang="en-US" sz="2000" dirty="0"/>
               <a:t>Kraken: a layer that extends Express with structure, built in security, and dynamic configuration</a:t>
             </a:r>
-            <a:endParaRPr lang="en-US" sz="1800" dirty="0" smtClean="0">
+            <a:endParaRPr lang="en-US" sz="1800" dirty="0">
               <a:latin typeface="Monaco"/>
               <a:cs typeface="Monaco"/>
             </a:endParaRPr>
           </a:p>
           <a:p>
             <a:r>
-              <a:rPr lang="en-US" sz="2000" dirty="0" smtClean="0"/>
+              <a:rPr lang="en-US" sz="2000" dirty="0"/>
               <a:t>Configuration: centrally located in </a:t>
             </a:r>
             <a:r>
-              <a:rPr lang="en-US" sz="1600" dirty="0" err="1" smtClean="0">
+              <a:rPr lang="en-US" sz="1600" dirty="0" err="1">
                 <a:latin typeface="Monaco"/>
                 <a:cs typeface="Monaco"/>
               </a:rPr>
               <a:t>config</a:t>
             </a:r>
             <a:r>
-              <a:rPr lang="en-US" sz="1600" dirty="0" smtClean="0">
+              <a:rPr lang="en-US" sz="1600" dirty="0">
                 <a:latin typeface="Monaco"/>
                 <a:cs typeface="Monaco"/>
               </a:rPr>
               <a:t>/</a:t>
             </a:r>
             <a:r>
-              <a:rPr lang="en-US" sz="1600" dirty="0" err="1" smtClean="0">
+              <a:rPr lang="en-US" sz="1600" dirty="0" err="1">
                 <a:latin typeface="Monaco"/>
                 <a:cs typeface="Monaco"/>
               </a:rPr>
               <a:t>config.json</a:t>
             </a:r>
             <a:r>
-              <a:rPr lang="en-US" sz="2000" dirty="0" smtClean="0"/>
+              <a:rPr lang="en-US" sz="2000" dirty="0"/>
               <a:t> and can be overridden by environment</a:t>
             </a:r>
           </a:p>
           <a:p>
             <a:r>
-              <a:rPr lang="en-US" sz="2000" dirty="0" smtClean="0"/>
+              <a:rPr lang="en-US" sz="2000" dirty="0"/>
               <a:t>Security: </a:t>
             </a:r>
             <a:r>
-              <a:rPr lang="en-US" sz="2000" dirty="0" err="1" smtClean="0"/>
+              <a:rPr lang="en-US" sz="2000" dirty="0" err="1"/>
               <a:t>Lusca</a:t>
             </a:r>
             <a:r>
-              <a:rPr lang="en-US" sz="2000" dirty="0" smtClean="0"/>
+              <a:rPr lang="en-US" sz="2000" dirty="0"/>
               <a:t> module enabled out of the box with many options</a:t>
             </a:r>
           </a:p>
           <a:p>
             <a:r>
-              <a:rPr lang="en-US" sz="2000" dirty="0" smtClean="0"/>
+              <a:rPr lang="en-US" sz="2000" dirty="0"/>
               <a:t>Routing: routing logic handled in </a:t>
             </a:r>
             <a:r>
-              <a:rPr lang="en-US" sz="1600" dirty="0" smtClean="0">
+              <a:rPr lang="en-US" sz="1600" dirty="0">
                 <a:latin typeface="Monaco"/>
                 <a:cs typeface="Monaco"/>
               </a:rPr>
               <a:t>controllers</a:t>
             </a:r>
             <a:r>
-              <a:rPr lang="en-US" sz="2000" dirty="0" smtClean="0"/>
+              <a:rPr lang="en-US" sz="2000" dirty="0"/>
               <a:t> directory grouped by functionality</a:t>
             </a:r>
           </a:p>
           <a:p>
             <a:r>
-              <a:rPr lang="en-US" sz="2000" dirty="0" smtClean="0"/>
+              <a:rPr lang="en-US" sz="2000" dirty="0"/>
               <a:t>Models: located in </a:t>
             </a:r>
             <a:r>
-              <a:rPr lang="en-US" sz="1800" dirty="0" smtClean="0">
+              <a:rPr lang="en-US" sz="1800" dirty="0">
                 <a:latin typeface="Monaco"/>
                 <a:cs typeface="Monaco"/>
               </a:rPr>
               <a:t>models</a:t>
             </a:r>
             <a:r>
-              <a:rPr lang="en-US" sz="2000" dirty="0" smtClean="0"/>
+              <a:rPr lang="en-US" sz="2000" dirty="0"/>
               <a:t> directory</a:t>
             </a:r>
           </a:p>
           <a:p>
             <a:r>
-              <a:rPr lang="en-US" sz="2000" dirty="0" smtClean="0"/>
+              <a:rPr lang="en-US" sz="2000" dirty="0"/>
               <a:t>Templates: Adaro module handles view templates. </a:t>
             </a:r>
             <a:r>
-              <a:rPr lang="en-US" sz="2000" dirty="0" err="1" smtClean="0"/>
+              <a:rPr lang="en-US" sz="2000" dirty="0" err="1"/>
               <a:t>Dust.js</a:t>
             </a:r>
             <a:r>
-              <a:rPr lang="en-US" sz="2000" dirty="0" smtClean="0"/>
+              <a:rPr lang="en-US" sz="2000" dirty="0"/>
               <a:t> used for </a:t>
             </a:r>
             <a:r>
-              <a:rPr lang="en-US" sz="2000" dirty="0" err="1" smtClean="0"/>
+              <a:rPr lang="en-US" sz="2000" dirty="0" err="1"/>
               <a:t>templating</a:t>
             </a:r>
             <a:r>
-              <a:rPr lang="en-US" sz="2000" dirty="0" smtClean="0"/>
+              <a:rPr lang="en-US" sz="2000" dirty="0"/>
               <a:t> language and located in </a:t>
             </a:r>
             <a:r>
-              <a:rPr lang="en-US" sz="1800" dirty="0" smtClean="0">
+              <a:rPr lang="en-US" sz="1800" dirty="0">
                 <a:latin typeface="Monaco"/>
                 <a:cs typeface="Monaco"/>
               </a:rPr>
               <a:t>public/templates</a:t>
             </a:r>
             <a:r>
-              <a:rPr lang="en-US" sz="2000" dirty="0" smtClean="0"/>
+              <a:rPr lang="en-US" sz="2000" dirty="0"/>
               <a:t> directory</a:t>
             </a:r>
           </a:p>
           <a:p>
             <a:r>
-              <a:rPr lang="en-US" sz="2000" dirty="0" smtClean="0"/>
-              <a:t>Kappa: serves as a proxy for </a:t>
-            </a:r>
-            <a:r>
-              <a:rPr lang="en-US" sz="1600" dirty="0" err="1" smtClean="0">
+              <a:rPr lang="en-US" sz="2000"/>
+              <a:t>Kappa</a:t>
+            </a:r>
+            <a:r>
+              <a:rPr lang="en-US" sz="2000"/>
+              <a:t>: serves as a proxy for </a:t>
+            </a:r>
+            <a:r>
+              <a:rPr lang="en-US" sz="1600">
                 <a:latin typeface="Monaco"/>
                 <a:cs typeface="Monaco"/>
               </a:rPr>
               <a:t>npm</a:t>
             </a:r>
             <a:r>
-              <a:rPr lang="en-US" sz="2000" dirty="0" smtClean="0"/>
+              <a:rPr lang="en-US" sz="2000"/>
               <a:t> allowing for private repos</a:t>
             </a:r>
-          </a:p>
-          <a:p>
-            <a:r>
-              <a:rPr lang="en-US" sz="2000" dirty="0" smtClean="0"/>
-              <a:t>Localization: Engine-</a:t>
-            </a:r>
-            <a:r>
-              <a:rPr lang="en-US" sz="2000" dirty="0" err="1" smtClean="0"/>
+            <a:endParaRPr lang="en-US" sz="2000" dirty="0"/>
+          </a:p>
+          <a:p>
+            <a:r>
+              <a:rPr lang="en-US" sz="2000"/>
+              <a:t>Localization</a:t>
+            </a:r>
+            <a:r>
+              <a:rPr lang="en-US" sz="2000" dirty="0"/>
+              <a:t>: Engine-</a:t>
+            </a:r>
+            <a:r>
+              <a:rPr lang="en-US" sz="2000" dirty="0" err="1"/>
               <a:t>munger</a:t>
             </a:r>
             <a:r>
-              <a:rPr lang="en-US" sz="2000" dirty="0" smtClean="0"/>
+              <a:rPr lang="en-US" sz="2000" dirty="0"/>
               <a:t> module handles loading content bundles based on request context</a:t>
             </a:r>
           </a:p>
@@ -12243,7 +12258,7 @@
   <p:timing>
     <p:tnLst>
       <p:par>
-        <p:cTn xmlns:p14="http://schemas.microsoft.com/office/powerpoint/2010/main" id="1" dur="indefinite" restart="never" nodeType="tmRoot"/>
+        <p:cTn id="1" dur="indefinite" restart="never" nodeType="tmRoot"/>
       </p:par>
     </p:tnLst>
   </p:timing>
@@ -12286,152 +12301,138 @@
               <a:buNone/>
             </a:pPr>
             <a:r>
-              <a:rPr lang="en-US" dirty="0" smtClean="0"/>
+              <a:rPr lang="en-US" dirty="0"/>
               <a:t>Kraken utilizes several </a:t>
             </a:r>
             <a:r>
-              <a:rPr lang="en-US" dirty="0" err="1" smtClean="0"/>
+              <a:rPr lang="en-US" dirty="0" err="1"/>
               <a:t>middlewares</a:t>
             </a:r>
             <a:r>
-              <a:rPr lang="en-US" dirty="0" smtClean="0"/>
+              <a:rPr lang="en-US" dirty="0"/>
               <a:t> that can be used independently or in conjunction with the main Kraken layer</a:t>
             </a:r>
           </a:p>
           <a:p>
             <a:r>
-              <a:rPr lang="en-US" b="1" dirty="0" err="1" smtClean="0"/>
+              <a:rPr lang="en-US" b="1" dirty="0" err="1"/>
               <a:t>Confit</a:t>
             </a:r>
             <a:r>
-              <a:rPr lang="en-US" dirty="0" smtClean="0"/>
+              <a:rPr lang="en-US" dirty="0"/>
               <a:t>—Configuration with overrides/additions</a:t>
             </a:r>
           </a:p>
           <a:p>
             <a:r>
-              <a:rPr lang="en-US" b="1" dirty="0" smtClean="0"/>
+              <a:rPr lang="en-US" b="1" dirty="0"/>
               <a:t>Shortstop</a:t>
             </a:r>
             <a:r>
-              <a:rPr lang="en-US" dirty="0" smtClean="0"/>
+              <a:rPr lang="en-US" dirty="0"/>
+              <a:t>—Loading configuration data from more than JSON</a:t>
+            </a:r>
+          </a:p>
+          <a:p>
+            <a:r>
+              <a:rPr lang="en-US" b="1" dirty="0" err="1"/>
+              <a:t>Meddleware</a:t>
+            </a:r>
+            <a:r>
+              <a:rPr lang="en-US" dirty="0"/>
+              <a:t>—middleware configuration</a:t>
+            </a:r>
+            <a:endParaRPr lang="en-US" b="1" dirty="0"/>
+          </a:p>
+          <a:p>
+            <a:r>
+              <a:rPr lang="en-US" b="1" dirty="0"/>
+              <a:t>Express-</a:t>
+            </a:r>
+            <a:r>
+              <a:rPr lang="en-US" b="1" dirty="0" err="1"/>
+              <a:t>enrouten</a:t>
+            </a:r>
+            <a:r>
+              <a:rPr lang="en-US" dirty="0"/>
+              <a:t>—route configuration middleware</a:t>
+            </a:r>
+            <a:endParaRPr lang="en-US" b="1" dirty="0"/>
+          </a:p>
+          <a:p>
+            <a:r>
+              <a:rPr lang="en-US" b="1" dirty="0" err="1"/>
+              <a:t>Lusca</a:t>
+            </a:r>
+            <a:r>
+              <a:rPr lang="en-US" dirty="0"/>
+              <a:t>—web application security middleware</a:t>
+            </a:r>
+          </a:p>
+          <a:p>
+            <a:r>
+              <a:rPr lang="en-US" b="1" dirty="0"/>
+              <a:t>Engine-</a:t>
+            </a:r>
+            <a:r>
+              <a:rPr lang="en-US" b="1" dirty="0" err="1"/>
+              <a:t>munger</a:t>
+            </a:r>
+            <a:r>
+              <a:rPr lang="en-US" dirty="0"/>
+              <a:t>—Localization middleware</a:t>
+            </a:r>
+            <a:endParaRPr lang="en-US" b="1" dirty="0"/>
+          </a:p>
+          <a:p>
+            <a:r>
+              <a:rPr lang="en-US" b="1"/>
+              <a:t>Kappa</a:t>
+            </a:r>
+            <a:r>
+              <a:rPr lang="en-US" sz="2000"/>
               <a:t>—</a:t>
             </a:r>
             <a:r>
+              <a:rPr lang="en-US" sz="2000" err="1">
+                <a:latin typeface="Monaco"/>
+                <a:cs typeface="Monaco"/>
+              </a:rPr>
+              <a:t>npm</a:t>
+            </a:r>
+            <a:r>
+              <a:rPr lang="en-US"/>
+              <a:t> proxy</a:t>
+            </a:r>
+            <a:r>
               <a:rPr lang="en-US" dirty="0"/>
-              <a:t>L</a:t>
-            </a:r>
-            <a:r>
-              <a:rPr lang="en-US" dirty="0" smtClean="0"/>
-              <a:t>oading configuration data from more than JSON</a:t>
-            </a:r>
-          </a:p>
-          <a:p>
-            <a:r>
-              <a:rPr lang="en-US" b="1" dirty="0" err="1" smtClean="0"/>
-              <a:t>Meddleware</a:t>
-            </a:r>
-            <a:r>
-              <a:rPr lang="en-US" dirty="0" smtClean="0"/>
-              <a:t>—middleware configuration</a:t>
-            </a:r>
-            <a:endParaRPr lang="en-US" b="1" dirty="0" smtClean="0"/>
-          </a:p>
-          <a:p>
-            <a:r>
-              <a:rPr lang="en-US" b="1" dirty="0" smtClean="0"/>
-              <a:t>Express-</a:t>
-            </a:r>
-            <a:r>
-              <a:rPr lang="en-US" b="1" dirty="0" err="1" smtClean="0"/>
-              <a:t>enrouten</a:t>
-            </a:r>
-            <a:r>
-              <a:rPr lang="en-US" dirty="0" smtClean="0"/>
-              <a:t>—route configuration middleware</a:t>
-            </a:r>
-            <a:endParaRPr lang="en-US" b="1" dirty="0" smtClean="0"/>
-          </a:p>
-          <a:p>
-            <a:r>
-              <a:rPr lang="en-US" b="1" dirty="0" err="1" smtClean="0"/>
-              <a:t>Lusca</a:t>
+              <a:t>,</a:t>
+            </a:r>
+            <a:r>
+              <a:rPr lang="en-US"/>
+              <a:t> the basis for http://</a:t>
+            </a:r>
+            <a:r>
+              <a:rPr lang="en-US" smtClean="0"/>
+              <a:t>npm.paypal.com</a:t>
+            </a:r>
+            <a:endParaRPr lang="en-US" dirty="0"/>
+          </a:p>
+          <a:p>
+            <a:r>
+              <a:rPr lang="en-US" b="1" dirty="0"/>
+              <a:t>Adaro</a:t>
             </a:r>
             <a:r>
               <a:rPr lang="en-US" dirty="0"/>
-              <a:t>—web </a:t>
-            </a:r>
-            <a:r>
-              <a:rPr lang="en-US" dirty="0" smtClean="0"/>
-              <a:t>application security middleware</a:t>
-            </a:r>
-          </a:p>
-          <a:p>
-            <a:r>
-              <a:rPr lang="en-US" b="1" dirty="0" smtClean="0"/>
-              <a:t>Engine-</a:t>
-            </a:r>
-            <a:r>
-              <a:rPr lang="en-US" b="1" dirty="0" err="1" smtClean="0"/>
-              <a:t>munger</a:t>
-            </a:r>
-            <a:r>
-              <a:rPr lang="en-US" dirty="0" smtClean="0"/>
-              <a:t>—Localization middleware</a:t>
-            </a:r>
-            <a:endParaRPr lang="en-US" b="1" dirty="0" smtClean="0"/>
-          </a:p>
-          <a:p>
-            <a:r>
-              <a:rPr lang="en-US" b="1" dirty="0" smtClean="0"/>
-              <a:t>Kappa</a:t>
-            </a:r>
-            <a:r>
-              <a:rPr lang="en-US" sz="2000" dirty="0"/>
-              <a:t>—</a:t>
-            </a:r>
-            <a:r>
-              <a:rPr lang="en-US" sz="2000" dirty="0" err="1" smtClean="0">
-                <a:latin typeface="Monaco"/>
-                <a:cs typeface="Monaco"/>
-              </a:rPr>
-              <a:t>npm</a:t>
-            </a:r>
-            <a:r>
-              <a:rPr lang="en-US" dirty="0" smtClean="0"/>
-              <a:t> proxy to enable private </a:t>
-            </a:r>
-            <a:r>
-              <a:rPr lang="en-US" sz="2000" dirty="0" err="1" smtClean="0">
-                <a:latin typeface="Monaco"/>
-                <a:cs typeface="Monaco"/>
-              </a:rPr>
-              <a:t>npm</a:t>
-            </a:r>
-            <a:r>
-              <a:rPr lang="en-US" dirty="0" smtClean="0"/>
-              <a:t> repositories</a:t>
-            </a:r>
-          </a:p>
-          <a:p>
-            <a:r>
-              <a:rPr lang="en-US" b="1" dirty="0" smtClean="0"/>
-              <a:t>Adaro</a:t>
+              <a:t>—Middleware for handling </a:t>
+            </a:r>
+            <a:r>
+              <a:rPr lang="en-US" dirty="0" err="1"/>
+              <a:t>Dust.js</a:t>
             </a:r>
             <a:r>
               <a:rPr lang="en-US" dirty="0"/>
-              <a:t>—Middleware </a:t>
-            </a:r>
-            <a:r>
-              <a:rPr lang="en-US" dirty="0" smtClean="0"/>
-              <a:t>for handling </a:t>
-            </a:r>
-            <a:r>
-              <a:rPr lang="en-US" dirty="0" err="1" smtClean="0"/>
-              <a:t>Dust.js</a:t>
-            </a:r>
-            <a:r>
-              <a:rPr lang="en-US" dirty="0" smtClean="0"/>
               <a:t> view rendering</a:t>
             </a:r>
           </a:p>
@@ -12513,7 +12514,7 @@
   <p:timing>
     <p:tnLst>
       <p:par>
-        <p:cTn xmlns:p14="http://schemas.microsoft.com/office/powerpoint/2010/main" id="1" dur="indefinite" restart="never" nodeType="tmRoot"/>
+        <p:cTn id="1" dur="indefinite" restart="never" nodeType="tmRoot"/>
       </p:par>
     </p:tnLst>
   </p:timing>
@@ -12838,7 +12839,7 @@
   <p:timing>
     <p:tnLst>
       <p:par>
-        <p:cTn xmlns:p14="http://schemas.microsoft.com/office/powerpoint/2010/main" id="1" dur="indefinite" restart="never" nodeType="tmRoot"/>
+        <p:cTn id="1" dur="indefinite" restart="never" nodeType="tmRoot"/>
       </p:par>
     </p:tnLst>
   </p:timing>
@@ -13130,7 +13131,7 @@
   <p:timing>
     <p:tnLst>
       <p:par>
-        <p:cTn xmlns:p14="http://schemas.microsoft.com/office/powerpoint/2010/main" id="1" dur="indefinite" restart="never" nodeType="tmRoot"/>
+        <p:cTn id="1" dur="indefinite" restart="never" nodeType="tmRoot"/>
       </p:par>
     </p:tnLst>
   </p:timing>
@@ -13402,7 +13403,7 @@
   <p:timing>
     <p:tnLst>
       <p:par>
-        <p:cTn xmlns:p14="http://schemas.microsoft.com/office/powerpoint/2010/main" id="1" dur="indefinite" restart="never" nodeType="tmRoot"/>
+        <p:cTn id="1" dur="indefinite" restart="never" nodeType="tmRoot"/>
       </p:par>
     </p:tnLst>
   </p:timing>
@@ -15571,7 +15572,7 @@
   <p:timing>
     <p:tnLst>
       <p:par>
-        <p:cTn xmlns:p14="http://schemas.microsoft.com/office/powerpoint/2010/main" id="1" dur="indefinite" restart="never" nodeType="tmRoot"/>
+        <p:cTn id="1" dur="indefinite" restart="never" nodeType="tmRoot"/>
       </p:par>
     </p:tnLst>
   </p:timing>
@@ -15618,41 +15619,9 @@
           </a:p>
         </p:txBody>
       </p:sp>
-      <p:sp>
-        <p:nvSpPr>
-          <p:cNvPr id="4" name="Slide Number Placeholder 3"/>
-          <p:cNvSpPr>
-            <a:spLocks noGrp="1"/>
-          </p:cNvSpPr>
-          <p:nvPr>
-            <p:ph type="sldNum" sz="quarter" idx="4294967295"/>
-          </p:nvPr>
-        </p:nvSpPr>
-        <p:spPr>
-          <a:xfrm>
-            <a:off x="8237538" y="6553200"/>
-            <a:ext cx="906462" cy="457200"/>
-          </a:xfrm>
-          <a:prstGeom prst="rect">
-            <a:avLst/>
-          </a:prstGeom>
-        </p:spPr>
-        <p:txBody>
-          <a:bodyPr/>
-          <a:lstStyle/>
-          <a:p>
-            <a:fld id="{0D854ACF-EFF3-42D3-AB5F-408268493A1F}" type="slidenum">
-              <a:rPr lang="en-US" smtClean="0"/>
-              <a:pPr/>
-              <a:t>9</a:t>
-            </a:fld>
-            <a:endParaRPr lang="en-US" dirty="0"/>
-          </a:p>
-        </p:txBody>
-      </p:sp>
       <p:grpSp>
         <p:nvGrpSpPr>
-          <p:cNvPr id="5" name="Group 4"/>
+          <p:cNvPr id="5" name="Group 2"/>
           <p:cNvGrpSpPr/>
           <p:nvPr/>
         </p:nvGrpSpPr>
@@ -15666,7 +15635,7 @@
         </p:grpSpPr>
         <p:sp>
           <p:nvSpPr>
-            <p:cNvPr id="7" name="Rectangle 6"/>
+            <p:cNvPr id="7" name="Rectangle 5"/>
             <p:cNvSpPr/>
             <p:nvPr/>
           </p:nvSpPr>
@@ -15724,7 +15693,7 @@
         </p:sp>
         <p:sp>
           <p:nvSpPr>
-            <p:cNvPr id="8" name="Oval 7"/>
+            <p:cNvPr id="8" name="Oval 20"/>
             <p:cNvSpPr/>
             <p:nvPr/>
           </p:nvSpPr>
@@ -15762,7 +15731,7 @@
                     <a:srgbClr val="000000"/>
                   </a:solidFill>
                 </a:rPr>
-                <a:t>Node</a:t>
+                <a:t>Node/Express</a:t>
               </a:r>
               <a:endParaRPr lang="en-US" dirty="0">
                 <a:solidFill>
@@ -15774,7 +15743,7 @@
         </p:sp>
         <p:sp>
           <p:nvSpPr>
-            <p:cNvPr id="9" name="Rectangle 8"/>
+            <p:cNvPr id="9" name="Rectangle 21"/>
             <p:cNvSpPr/>
             <p:nvPr/>
           </p:nvSpPr>
@@ -15851,7 +15820,7 @@
         </p:sp>
         <p:sp>
           <p:nvSpPr>
-            <p:cNvPr id="10" name="Rectangle 9"/>
+            <p:cNvPr id="10" name="Rectangle 22"/>
             <p:cNvSpPr/>
             <p:nvPr/>
           </p:nvSpPr>
@@ -15920,7 +15889,7 @@
         </p:sp>
         <p:sp>
           <p:nvSpPr>
-            <p:cNvPr id="11" name="Rectangle 10"/>
+            <p:cNvPr id="24" name="Rectangle 23"/>
             <p:cNvSpPr/>
             <p:nvPr/>
           </p:nvSpPr>
@@ -15997,7 +15966,7 @@
         </p:sp>
         <p:cxnSp>
           <p:nvCxnSpPr>
-            <p:cNvPr id="12" name="Straight Arrow Connector 11"/>
+            <p:cNvPr id="12" name="Straight Arrow Connector 24"/>
             <p:cNvCxnSpPr>
               <a:stCxn id="8" idx="2"/>
               <a:endCxn id="9" idx="0"/>
@@ -16006,7 +15975,7 @@
           </p:nvCxnSpPr>
           <p:spPr>
             <a:xfrm flipH="1">
-              <a:off x="1098094" y="2585598"/>
+              <a:off x="1098095" y="2585597"/>
               <a:ext cx="2127319" cy="1550267"/>
             </a:xfrm>
             <a:prstGeom prst="straightConnector1">
@@ -16036,17 +16005,17 @@
         </p:cxnSp>
         <p:cxnSp>
           <p:nvCxnSpPr>
-            <p:cNvPr id="13" name="Straight Arrow Connector 12"/>
+            <p:cNvPr id="13" name="Straight Arrow Connector 25"/>
             <p:cNvCxnSpPr>
-              <a:stCxn id="11" idx="0"/>
+              <a:stCxn id="24" idx="0"/>
               <a:endCxn id="8" idx="6"/>
             </p:cNvCxnSpPr>
             <p:nvPr/>
           </p:nvCxnSpPr>
           <p:spPr>
             <a:xfrm flipH="1" flipV="1">
-              <a:off x="5016294" y="2585598"/>
-              <a:ext cx="2436645" cy="1550267"/>
+              <a:off x="5016295" y="2585599"/>
+              <a:ext cx="2436644" cy="1550266"/>
             </a:xfrm>
             <a:prstGeom prst="straightConnector1">
               <a:avLst/>
@@ -16075,7 +16044,7 @@
         </p:cxnSp>
         <p:cxnSp>
           <p:nvCxnSpPr>
-            <p:cNvPr id="14" name="Straight Arrow Connector 13"/>
+            <p:cNvPr id="14" name="Straight Arrow Connector 26"/>
             <p:cNvCxnSpPr>
               <a:stCxn id="7" idx="2"/>
               <a:endCxn id="8" idx="0"/>
@@ -16084,7 +16053,7 @@
           </p:nvCxnSpPr>
           <p:spPr>
             <a:xfrm>
-              <a:off x="4120854" y="1123776"/>
+              <a:off x="4120854" y="1123777"/>
               <a:ext cx="0" cy="785729"/>
             </a:xfrm>
             <a:prstGeom prst="straightConnector1">
@@ -16114,7 +16083,7 @@
         </p:cxnSp>
         <p:sp>
           <p:nvSpPr>
-            <p:cNvPr id="15" name="TextBox 14"/>
+            <p:cNvPr id="15" name="TextBox 27"/>
             <p:cNvSpPr txBox="1"/>
             <p:nvPr/>
           </p:nvSpPr>
@@ -16144,7 +16113,7 @@
         </p:sp>
         <p:sp>
           <p:nvSpPr>
-            <p:cNvPr id="16" name="TextBox 15"/>
+            <p:cNvPr id="16" name="TextBox 28"/>
             <p:cNvSpPr txBox="1"/>
             <p:nvPr/>
           </p:nvSpPr>
@@ -16174,7 +16143,7 @@
         </p:sp>
         <p:sp>
           <p:nvSpPr>
-            <p:cNvPr id="17" name="TextBox 16"/>
+            <p:cNvPr id="17" name="TextBox 29"/>
             <p:cNvSpPr txBox="1"/>
             <p:nvPr/>
           </p:nvSpPr>
@@ -16204,7 +16173,7 @@
         </p:sp>
         <p:cxnSp>
           <p:nvCxnSpPr>
-            <p:cNvPr id="18" name="Straight Arrow Connector 17"/>
+            <p:cNvPr id="18" name="Straight Arrow Connector 30"/>
             <p:cNvCxnSpPr>
               <a:endCxn id="10" idx="1"/>
             </p:cNvCxnSpPr>
@@ -16213,7 +16182,7 @@
           <p:spPr>
             <a:xfrm>
               <a:off x="1797086" y="4289753"/>
-              <a:ext cx="1690596" cy="12055"/>
+              <a:ext cx="1690596" cy="12056"/>
             </a:xfrm>
             <a:prstGeom prst="straightConnector1">
               <a:avLst/>
@@ -16242,7 +16211,7 @@
         </p:cxnSp>
         <p:sp>
           <p:nvSpPr>
-            <p:cNvPr id="19" name="TextBox 18"/>
+            <p:cNvPr id="19" name="TextBox 31"/>
             <p:cNvSpPr txBox="1"/>
             <p:nvPr/>
           </p:nvSpPr>
@@ -16284,7 +16253,7 @@
         </p:sp>
         <p:cxnSp>
           <p:nvCxnSpPr>
-            <p:cNvPr id="20" name="Straight Arrow Connector 19"/>
+            <p:cNvPr id="20" name="Straight Arrow Connector 32"/>
             <p:cNvCxnSpPr/>
             <p:nvPr/>
           </p:nvCxnSpPr>
@@ -16319,6 +16288,38 @@
           </p:style>
         </p:cxnSp>
       </p:grpSp>
+      <p:sp>
+        <p:nvSpPr>
+          <p:cNvPr id="4" name="Slide Number Placeholder 3"/>
+          <p:cNvSpPr>
+            <a:spLocks noGrp="1"/>
+          </p:cNvSpPr>
+          <p:nvPr>
+            <p:ph type="sldNum" sz="quarter" idx="4294967295"/>
+          </p:nvPr>
+        </p:nvSpPr>
+        <p:spPr>
+          <a:xfrm>
+            <a:off x="8237538" y="6553200"/>
+            <a:ext cx="906462" cy="457200"/>
+          </a:xfrm>
+          <a:prstGeom prst="rect">
+            <a:avLst/>
+          </a:prstGeom>
+        </p:spPr>
+        <p:txBody>
+          <a:bodyPr/>
+          <a:lstStyle/>
+          <a:p>
+            <a:fld id="{0D854ACF-EFF3-42D3-AB5F-408268493A1F}" type="slidenum">
+              <a:rPr lang="en-US" smtClean="0"/>
+              <a:pPr/>
+              <a:t>9</a:t>
+            </a:fld>
+            <a:endParaRPr lang="en-US" dirty="0"/>
+          </a:p>
+        </p:txBody>
+      </p:sp>
     </p:spTree>
     <p:extLst>
       <p:ext uri="{BB962C8B-B14F-4D97-AF65-F5344CB8AC3E}">
@@ -16340,7 +16341,7 @@
   <p:timing>
     <p:tnLst>
       <p:par>
-        <p:cTn xmlns:p14="http://schemas.microsoft.com/office/powerpoint/2010/main" id="1" dur="indefinite" restart="never" nodeType="tmRoot"/>
+        <p:cTn id="1" dur="indefinite" restart="never" nodeType="tmRoot"/>
       </p:par>
     </p:tnLst>
   </p:timing>

</xml_diff>

<commit_message>
Changed order of browser pix in Kraken ppt.
</commit_message>
<xml_diff>
--- a/node/lesson-80-kraken/kraken.pptx
+++ b/node/lesson-80-kraken/kraken.pptx
@@ -18,8 +18,8 @@
     <p:sldId id="302" r:id="rId6"/>
     <p:sldId id="303" r:id="rId7"/>
     <p:sldId id="304" r:id="rId8"/>
-    <p:sldId id="328" r:id="rId9"/>
-    <p:sldId id="329" r:id="rId10"/>
+    <p:sldId id="329" r:id="rId9"/>
+    <p:sldId id="328" r:id="rId10"/>
     <p:sldId id="305" r:id="rId11"/>
     <p:sldId id="306" r:id="rId12"/>
     <p:sldId id="315" r:id="rId13"/>
@@ -740,7 +740,7 @@
             <a:fld id="{6AFC80D5-740B-4CAF-B407-EC08971373CE}" type="slidenum">
               <a:rPr lang="en-US" smtClean="0"/>
               <a:pPr/>
-              <a:t>8</a:t>
+              <a:t>9</a:t>
             </a:fld>
             <a:endParaRPr lang="en-US" dirty="0"/>
           </a:p>
@@ -11011,15 +11011,7 @@
             </a:r>
             <a:r>
               <a:rPr lang="en-US"/>
-              <a:t>to </a:t>
-            </a:r>
-            <a:r>
-              <a:rPr lang="en-US"/>
-              <a:t>provide</a:t>
-            </a:r>
-            <a:r>
-              <a:rPr lang="en-US"/>
-              <a:t> </a:t>
+              <a:t>to provide </a:t>
             </a:r>
             <a:r>
               <a:rPr lang="en-US" smtClean="0"/>
@@ -12138,11 +12130,7 @@
           <a:p>
             <a:r>
               <a:rPr lang="en-US" sz="2000"/>
-              <a:t>Kappa</a:t>
-            </a:r>
-            <a:r>
-              <a:rPr lang="en-US" sz="2000"/>
-              <a:t>: serves as a proxy for </a:t>
+              <a:t>Kappa: serves as a proxy for </a:t>
             </a:r>
             <a:r>
               <a:rPr lang="en-US" sz="1600">
@@ -13429,6 +13417,775 @@
       </p:grpSpPr>
       <p:sp>
         <p:nvSpPr>
+          <p:cNvPr id="2" name="Title 1"/>
+          <p:cNvSpPr>
+            <a:spLocks noGrp="1"/>
+          </p:cNvSpPr>
+          <p:nvPr>
+            <p:ph type="title"/>
+          </p:nvPr>
+        </p:nvSpPr>
+        <p:spPr/>
+        <p:txBody>
+          <a:bodyPr/>
+          <a:lstStyle/>
+          <a:p>
+            <a:r>
+              <a:rPr lang="en-US" dirty="0" smtClean="0"/>
+              <a:t>Overview: Request Flow</a:t>
+            </a:r>
+            <a:endParaRPr lang="en-US" dirty="0"/>
+          </a:p>
+        </p:txBody>
+      </p:sp>
+      <p:grpSp>
+        <p:nvGrpSpPr>
+          <p:cNvPr id="28" name="Group 27"/>
+          <p:cNvGrpSpPr/>
+          <p:nvPr/>
+        </p:nvGrpSpPr>
+        <p:grpSpPr>
+          <a:xfrm>
+            <a:off x="685800" y="1539834"/>
+            <a:ext cx="7321786" cy="4376063"/>
+            <a:chOff x="685800" y="1539834"/>
+            <a:chExt cx="7321786" cy="4376063"/>
+          </a:xfrm>
+        </p:grpSpPr>
+        <p:sp>
+          <p:nvSpPr>
+            <p:cNvPr id="7" name="Rectangle 5"/>
+            <p:cNvSpPr/>
+            <p:nvPr/>
+          </p:nvSpPr>
+          <p:spPr>
+            <a:xfrm>
+              <a:off x="3416041" y="1539834"/>
+              <a:ext cx="1309463" cy="762923"/>
+            </a:xfrm>
+            <a:prstGeom prst="rect">
+              <a:avLst/>
+            </a:prstGeom>
+          </p:spPr>
+          <p:style>
+            <a:lnRef idx="1">
+              <a:schemeClr val="accent1"/>
+            </a:lnRef>
+            <a:fillRef idx="3">
+              <a:schemeClr val="accent1"/>
+            </a:fillRef>
+            <a:effectRef idx="2">
+              <a:schemeClr val="accent1"/>
+            </a:effectRef>
+            <a:fontRef idx="minor">
+              <a:schemeClr val="lt1"/>
+            </a:fontRef>
+          </p:style>
+          <p:txBody>
+            <a:bodyPr rtlCol="0" anchor="ctr"/>
+            <a:lstStyle/>
+            <a:p>
+              <a:pPr algn="ctr"/>
+              <a:r>
+                <a:rPr lang="en-US" dirty="0">
+                  <a:solidFill>
+                    <a:srgbClr val="000000"/>
+                  </a:solidFill>
+                </a:rPr>
+                <a:t>B</a:t>
+              </a:r>
+              <a:r>
+                <a:rPr lang="en-US" dirty="0" smtClean="0">
+                  <a:solidFill>
+                    <a:srgbClr val="000000"/>
+                  </a:solidFill>
+                </a:rPr>
+                <a:t>rowser</a:t>
+              </a:r>
+              <a:endParaRPr lang="en-US" dirty="0">
+                <a:solidFill>
+                  <a:srgbClr val="000000"/>
+                </a:solidFill>
+              </a:endParaRPr>
+            </a:p>
+          </p:txBody>
+        </p:sp>
+        <p:sp>
+          <p:nvSpPr>
+            <p:cNvPr id="8" name="Oval 20"/>
+            <p:cNvSpPr/>
+            <p:nvPr/>
+          </p:nvSpPr>
+          <p:spPr>
+            <a:xfrm>
+              <a:off x="2807547" y="3032506"/>
+              <a:ext cx="2526453" cy="1283097"/>
+            </a:xfrm>
+            <a:prstGeom prst="ellipse">
+              <a:avLst/>
+            </a:prstGeom>
+          </p:spPr>
+          <p:style>
+            <a:lnRef idx="1">
+              <a:schemeClr val="accent1"/>
+            </a:lnRef>
+            <a:fillRef idx="3">
+              <a:schemeClr val="accent1"/>
+            </a:fillRef>
+            <a:effectRef idx="2">
+              <a:schemeClr val="accent1"/>
+            </a:effectRef>
+            <a:fontRef idx="minor">
+              <a:schemeClr val="lt1"/>
+            </a:fontRef>
+          </p:style>
+          <p:txBody>
+            <a:bodyPr rtlCol="0" anchor="ctr"/>
+            <a:lstStyle/>
+            <a:p>
+              <a:pPr algn="ctr"/>
+              <a:r>
+                <a:rPr lang="en-US" dirty="0" smtClean="0">
+                  <a:solidFill>
+                    <a:srgbClr val="000000"/>
+                  </a:solidFill>
+                </a:rPr>
+                <a:t>Node/Express</a:t>
+              </a:r>
+              <a:endParaRPr lang="en-US" dirty="0">
+                <a:solidFill>
+                  <a:srgbClr val="000000"/>
+                </a:solidFill>
+              </a:endParaRPr>
+            </a:p>
+          </p:txBody>
+        </p:sp>
+        <p:sp>
+          <p:nvSpPr>
+            <p:cNvPr id="9" name="Rectangle 21"/>
+            <p:cNvSpPr/>
+            <p:nvPr/>
+          </p:nvSpPr>
+          <p:spPr>
+            <a:xfrm>
+              <a:off x="685800" y="5145112"/>
+              <a:ext cx="1309463" cy="762923"/>
+            </a:xfrm>
+            <a:prstGeom prst="rect">
+              <a:avLst/>
+            </a:prstGeom>
+          </p:spPr>
+          <p:style>
+            <a:lnRef idx="1">
+              <a:schemeClr val="accent1"/>
+            </a:lnRef>
+            <a:fillRef idx="3">
+              <a:schemeClr val="accent1"/>
+            </a:fillRef>
+            <a:effectRef idx="2">
+              <a:schemeClr val="accent1"/>
+            </a:effectRef>
+            <a:fontRef idx="minor">
+              <a:schemeClr val="lt1"/>
+            </a:fontRef>
+          </p:style>
+          <p:txBody>
+            <a:bodyPr rtlCol="0" anchor="ctr"/>
+            <a:lstStyle/>
+            <a:p>
+              <a:pPr algn="ctr"/>
+              <a:r>
+                <a:rPr lang="en-US" sz="1400" dirty="0" smtClean="0">
+                  <a:solidFill>
+                    <a:srgbClr val="000000"/>
+                  </a:solidFill>
+                </a:rPr>
+                <a:t>/controllers/</a:t>
+              </a:r>
+            </a:p>
+            <a:p>
+              <a:pPr algn="ctr"/>
+              <a:r>
+                <a:rPr lang="en-US" sz="1400" dirty="0" smtClean="0">
+                  <a:solidFill>
+                    <a:srgbClr val="FF0000"/>
+                  </a:solidFill>
+                </a:rPr>
+                <a:t>pay</a:t>
+              </a:r>
+              <a:r>
+                <a:rPr lang="en-US" sz="1400" dirty="0" smtClean="0">
+                  <a:solidFill>
+                    <a:srgbClr val="000000"/>
+                  </a:solidFill>
+                </a:rPr>
+                <a:t>/</a:t>
+              </a:r>
+              <a:r>
+                <a:rPr lang="en-US" sz="1400" dirty="0" err="1" smtClean="0">
+                  <a:solidFill>
+                    <a:srgbClr val="000000"/>
+                  </a:solidFill>
+                </a:rPr>
+                <a:t>index.js</a:t>
+              </a:r>
+              <a:endParaRPr lang="en-US" sz="1400" dirty="0">
+                <a:solidFill>
+                  <a:srgbClr val="000000"/>
+                </a:solidFill>
+              </a:endParaRPr>
+            </a:p>
+          </p:txBody>
+        </p:sp>
+        <p:sp>
+          <p:nvSpPr>
+            <p:cNvPr id="10" name="Rectangle 22"/>
+            <p:cNvSpPr/>
+            <p:nvPr/>
+          </p:nvSpPr>
+          <p:spPr>
+            <a:xfrm>
+              <a:off x="3578810" y="4921116"/>
+              <a:ext cx="1309463" cy="762923"/>
+            </a:xfrm>
+            <a:prstGeom prst="rect">
+              <a:avLst/>
+            </a:prstGeom>
+          </p:spPr>
+          <p:style>
+            <a:lnRef idx="1">
+              <a:schemeClr val="accent1"/>
+            </a:lnRef>
+            <a:fillRef idx="3">
+              <a:schemeClr val="accent1"/>
+            </a:fillRef>
+            <a:effectRef idx="2">
+              <a:schemeClr val="accent1"/>
+            </a:effectRef>
+            <a:fontRef idx="minor">
+              <a:schemeClr val="lt1"/>
+            </a:fontRef>
+          </p:style>
+          <p:txBody>
+            <a:bodyPr rtlCol="0" anchor="ctr"/>
+            <a:lstStyle/>
+            <a:p>
+              <a:pPr algn="ctr"/>
+              <a:r>
+                <a:rPr lang="en-US" sz="1400" dirty="0" smtClean="0">
+                  <a:solidFill>
+                    <a:srgbClr val="000000"/>
+                  </a:solidFill>
+                </a:rPr>
+                <a:t>/models/</a:t>
+              </a:r>
+            </a:p>
+            <a:p>
+              <a:pPr algn="ctr"/>
+              <a:r>
+                <a:rPr lang="en-US" sz="1400" dirty="0" err="1" smtClean="0">
+                  <a:solidFill>
+                    <a:srgbClr val="FF0000"/>
+                  </a:solidFill>
+                </a:rPr>
+                <a:t>pay</a:t>
+              </a:r>
+              <a:r>
+                <a:rPr lang="en-US" sz="1400" dirty="0" err="1" smtClean="0">
+                  <a:solidFill>
+                    <a:srgbClr val="000000"/>
+                  </a:solidFill>
+                </a:rPr>
+                <a:t>.js</a:t>
+              </a:r>
+              <a:endParaRPr lang="en-US" sz="1400" dirty="0">
+                <a:solidFill>
+                  <a:srgbClr val="000000"/>
+                </a:solidFill>
+              </a:endParaRPr>
+            </a:p>
+          </p:txBody>
+        </p:sp>
+        <p:sp>
+          <p:nvSpPr>
+            <p:cNvPr id="24" name="Rectangle 23"/>
+            <p:cNvSpPr/>
+            <p:nvPr/>
+          </p:nvSpPr>
+          <p:spPr>
+            <a:xfrm>
+              <a:off x="6352914" y="5152974"/>
+              <a:ext cx="1575018" cy="762923"/>
+            </a:xfrm>
+            <a:prstGeom prst="rect">
+              <a:avLst/>
+            </a:prstGeom>
+          </p:spPr>
+          <p:style>
+            <a:lnRef idx="1">
+              <a:schemeClr val="accent1"/>
+            </a:lnRef>
+            <a:fillRef idx="3">
+              <a:schemeClr val="accent1"/>
+            </a:fillRef>
+            <a:effectRef idx="2">
+              <a:schemeClr val="accent1"/>
+            </a:effectRef>
+            <a:fontRef idx="minor">
+              <a:schemeClr val="lt1"/>
+            </a:fontRef>
+          </p:style>
+          <p:txBody>
+            <a:bodyPr rtlCol="0" anchor="ctr"/>
+            <a:lstStyle/>
+            <a:p>
+              <a:pPr algn="ctr"/>
+              <a:r>
+                <a:rPr lang="en-US" sz="1400" dirty="0" smtClean="0">
+                  <a:solidFill>
+                    <a:srgbClr val="000000"/>
+                  </a:solidFill>
+                </a:rPr>
+                <a:t>/public/template/</a:t>
+              </a:r>
+            </a:p>
+            <a:p>
+              <a:pPr algn="ctr"/>
+              <a:r>
+                <a:rPr lang="en-US" sz="1400" dirty="0" smtClean="0">
+                  <a:solidFill>
+                    <a:srgbClr val="FF0000"/>
+                  </a:solidFill>
+                </a:rPr>
+                <a:t>pay</a:t>
+              </a:r>
+              <a:r>
+                <a:rPr lang="en-US" sz="1400" dirty="0" smtClean="0">
+                  <a:solidFill>
+                    <a:srgbClr val="000000"/>
+                  </a:solidFill>
+                </a:rPr>
+                <a:t>/</a:t>
+              </a:r>
+              <a:r>
+                <a:rPr lang="en-US" sz="1400" dirty="0" err="1" smtClean="0">
+                  <a:solidFill>
+                    <a:srgbClr val="000000"/>
+                  </a:solidFill>
+                </a:rPr>
+                <a:t>index.dust</a:t>
+              </a:r>
+              <a:endParaRPr lang="en-US" sz="1400" dirty="0">
+                <a:solidFill>
+                  <a:srgbClr val="000000"/>
+                </a:solidFill>
+              </a:endParaRPr>
+            </a:p>
+          </p:txBody>
+        </p:sp>
+        <p:cxnSp>
+          <p:nvCxnSpPr>
+            <p:cNvPr id="12" name="Straight Arrow Connector 24"/>
+            <p:cNvCxnSpPr>
+              <a:stCxn id="8" idx="2"/>
+              <a:endCxn id="9" idx="0"/>
+            </p:cNvCxnSpPr>
+            <p:nvPr/>
+          </p:nvCxnSpPr>
+          <p:spPr>
+            <a:xfrm flipH="1">
+              <a:off x="1340532" y="3674055"/>
+              <a:ext cx="1467015" cy="1471057"/>
+            </a:xfrm>
+            <a:prstGeom prst="straightConnector1">
+              <a:avLst/>
+            </a:prstGeom>
+            <a:ln>
+              <a:solidFill>
+                <a:srgbClr val="000000"/>
+              </a:solidFill>
+              <a:tailEnd type="arrow"/>
+            </a:ln>
+          </p:spPr>
+          <p:style>
+            <a:lnRef idx="2">
+              <a:schemeClr val="accent1"/>
+            </a:lnRef>
+            <a:fillRef idx="0">
+              <a:schemeClr val="accent1"/>
+            </a:fillRef>
+            <a:effectRef idx="1">
+              <a:schemeClr val="accent1"/>
+            </a:effectRef>
+            <a:fontRef idx="minor">
+              <a:schemeClr val="tx1"/>
+            </a:fontRef>
+          </p:style>
+        </p:cxnSp>
+        <p:cxnSp>
+          <p:nvCxnSpPr>
+            <p:cNvPr id="13" name="Straight Arrow Connector 25"/>
+            <p:cNvCxnSpPr>
+              <a:stCxn id="24" idx="0"/>
+              <a:endCxn id="8" idx="6"/>
+            </p:cNvCxnSpPr>
+            <p:nvPr/>
+          </p:nvCxnSpPr>
+          <p:spPr>
+            <a:xfrm flipH="1" flipV="1">
+              <a:off x="5334000" y="3674055"/>
+              <a:ext cx="1806423" cy="1478919"/>
+            </a:xfrm>
+            <a:prstGeom prst="straightConnector1">
+              <a:avLst/>
+            </a:prstGeom>
+            <a:ln>
+              <a:solidFill>
+                <a:srgbClr val="000000"/>
+              </a:solidFill>
+              <a:tailEnd type="arrow"/>
+            </a:ln>
+          </p:spPr>
+          <p:style>
+            <a:lnRef idx="2">
+              <a:schemeClr val="accent1"/>
+            </a:lnRef>
+            <a:fillRef idx="0">
+              <a:schemeClr val="accent1"/>
+            </a:fillRef>
+            <a:effectRef idx="1">
+              <a:schemeClr val="accent1"/>
+            </a:effectRef>
+            <a:fontRef idx="minor">
+              <a:schemeClr val="tx1"/>
+            </a:fontRef>
+          </p:style>
+        </p:cxnSp>
+        <p:cxnSp>
+          <p:nvCxnSpPr>
+            <p:cNvPr id="14" name="Straight Arrow Connector 26"/>
+            <p:cNvCxnSpPr>
+              <a:stCxn id="7" idx="2"/>
+              <a:endCxn id="8" idx="0"/>
+            </p:cNvCxnSpPr>
+            <p:nvPr/>
+          </p:nvCxnSpPr>
+          <p:spPr>
+            <a:xfrm>
+              <a:off x="4070773" y="2302757"/>
+              <a:ext cx="1" cy="729749"/>
+            </a:xfrm>
+            <a:prstGeom prst="straightConnector1">
+              <a:avLst/>
+            </a:prstGeom>
+            <a:ln>
+              <a:solidFill>
+                <a:srgbClr val="000000"/>
+              </a:solidFill>
+              <a:tailEnd type="arrow"/>
+            </a:ln>
+          </p:spPr>
+          <p:style>
+            <a:lnRef idx="2">
+              <a:schemeClr val="accent1"/>
+            </a:lnRef>
+            <a:fillRef idx="0">
+              <a:schemeClr val="accent1"/>
+            </a:fillRef>
+            <a:effectRef idx="1">
+              <a:schemeClr val="accent1"/>
+            </a:effectRef>
+            <a:fontRef idx="minor">
+              <a:schemeClr val="tx1"/>
+            </a:fontRef>
+          </p:style>
+        </p:cxnSp>
+        <p:sp>
+          <p:nvSpPr>
+            <p:cNvPr id="15" name="TextBox 27"/>
+            <p:cNvSpPr txBox="1"/>
+            <p:nvPr/>
+          </p:nvSpPr>
+          <p:spPr>
+            <a:xfrm>
+              <a:off x="816653" y="4623220"/>
+              <a:ext cx="873248" cy="307777"/>
+            </a:xfrm>
+            <a:prstGeom prst="rect">
+              <a:avLst/>
+            </a:prstGeom>
+            <a:noFill/>
+          </p:spPr>
+          <p:txBody>
+            <a:bodyPr wrap="square" rtlCol="0">
+              <a:spAutoFit/>
+            </a:bodyPr>
+            <a:lstStyle/>
+            <a:p>
+              <a:r>
+                <a:rPr lang="en-US" sz="1400" dirty="0" smtClean="0"/>
+                <a:t>invokes</a:t>
+              </a:r>
+              <a:endParaRPr lang="en-US" sz="1400" dirty="0"/>
+            </a:p>
+          </p:txBody>
+        </p:sp>
+        <p:sp>
+          <p:nvSpPr>
+            <p:cNvPr id="16" name="TextBox 28"/>
+            <p:cNvSpPr txBox="1"/>
+            <p:nvPr/>
+          </p:nvSpPr>
+          <p:spPr>
+            <a:xfrm>
+              <a:off x="2196362" y="4999086"/>
+              <a:ext cx="1222371" cy="307777"/>
+            </a:xfrm>
+            <a:prstGeom prst="rect">
+              <a:avLst/>
+            </a:prstGeom>
+            <a:noFill/>
+          </p:spPr>
+          <p:txBody>
+            <a:bodyPr wrap="square" rtlCol="0">
+              <a:spAutoFit/>
+            </a:bodyPr>
+            <a:lstStyle/>
+            <a:p>
+              <a:r>
+                <a:rPr lang="en-US" sz="1400" dirty="0" smtClean="0"/>
+                <a:t>manipulates</a:t>
+              </a:r>
+              <a:endParaRPr lang="en-US" sz="1400" dirty="0"/>
+            </a:p>
+          </p:txBody>
+        </p:sp>
+        <p:sp>
+          <p:nvSpPr>
+            <p:cNvPr id="17" name="TextBox 29"/>
+            <p:cNvSpPr txBox="1"/>
+            <p:nvPr/>
+          </p:nvSpPr>
+          <p:spPr>
+            <a:xfrm>
+              <a:off x="5257800" y="5410200"/>
+              <a:ext cx="998871" cy="307777"/>
+            </a:xfrm>
+            <a:prstGeom prst="rect">
+              <a:avLst/>
+            </a:prstGeom>
+            <a:noFill/>
+          </p:spPr>
+          <p:txBody>
+            <a:bodyPr wrap="square" rtlCol="0">
+              <a:spAutoFit/>
+            </a:bodyPr>
+            <a:lstStyle/>
+            <a:p>
+              <a:r>
+                <a:rPr lang="en-US" sz="1400" dirty="0" smtClean="0"/>
+                <a:t>renders</a:t>
+              </a:r>
+              <a:endParaRPr lang="en-US" sz="1400" dirty="0"/>
+            </a:p>
+          </p:txBody>
+        </p:sp>
+        <p:cxnSp>
+          <p:nvCxnSpPr>
+            <p:cNvPr id="18" name="Straight Arrow Connector 30"/>
+            <p:cNvCxnSpPr>
+              <a:endCxn id="10" idx="1"/>
+            </p:cNvCxnSpPr>
+            <p:nvPr/>
+          </p:nvCxnSpPr>
+          <p:spPr>
+            <a:xfrm>
+              <a:off x="1995263" y="5291138"/>
+              <a:ext cx="1583547" cy="11440"/>
+            </a:xfrm>
+            <a:prstGeom prst="straightConnector1">
+              <a:avLst/>
+            </a:prstGeom>
+            <a:ln>
+              <a:solidFill>
+                <a:srgbClr val="000000"/>
+              </a:solidFill>
+              <a:tailEnd type="arrow"/>
+            </a:ln>
+          </p:spPr>
+          <p:style>
+            <a:lnRef idx="2">
+              <a:schemeClr val="accent1"/>
+            </a:lnRef>
+            <a:fillRef idx="0">
+              <a:schemeClr val="accent1"/>
+            </a:fillRef>
+            <a:effectRef idx="1">
+              <a:schemeClr val="accent1"/>
+            </a:effectRef>
+            <a:fontRef idx="minor">
+              <a:schemeClr val="tx1"/>
+            </a:fontRef>
+          </p:style>
+        </p:cxnSp>
+        <p:sp>
+          <p:nvSpPr>
+            <p:cNvPr id="19" name="TextBox 31"/>
+            <p:cNvSpPr txBox="1"/>
+            <p:nvPr/>
+          </p:nvSpPr>
+          <p:spPr>
+            <a:xfrm>
+              <a:off x="4189003" y="2487679"/>
+              <a:ext cx="3818583" cy="307777"/>
+            </a:xfrm>
+            <a:prstGeom prst="rect">
+              <a:avLst/>
+            </a:prstGeom>
+            <a:noFill/>
+          </p:spPr>
+          <p:txBody>
+            <a:bodyPr wrap="square" rtlCol="0">
+              <a:spAutoFit/>
+            </a:bodyPr>
+            <a:lstStyle/>
+            <a:p>
+              <a:r>
+                <a:rPr lang="en-US" sz="1400" dirty="0" smtClean="0"/>
+                <a:t>http://localhost:8000/</a:t>
+              </a:r>
+              <a:r>
+                <a:rPr lang="en-US" sz="1400" dirty="0" smtClean="0">
+                  <a:solidFill>
+                    <a:srgbClr val="FF0000"/>
+                  </a:solidFill>
+                </a:rPr>
+                <a:t>pay</a:t>
+              </a:r>
+              <a:r>
+                <a:rPr lang="en-US" sz="1400" dirty="0" smtClean="0"/>
+                <a:t>?amt=100&amp;acct=293 </a:t>
+              </a:r>
+              <a:endParaRPr lang="en-US" sz="1400" dirty="0"/>
+            </a:p>
+          </p:txBody>
+        </p:sp>
+        <p:cxnSp>
+          <p:nvCxnSpPr>
+            <p:cNvPr id="20" name="Straight Arrow Connector 32"/>
+            <p:cNvCxnSpPr/>
+            <p:nvPr/>
+          </p:nvCxnSpPr>
+          <p:spPr>
+            <a:xfrm>
+              <a:off x="1995263" y="5773864"/>
+              <a:ext cx="4583119" cy="11439"/>
+            </a:xfrm>
+            <a:prstGeom prst="straightConnector1">
+              <a:avLst/>
+            </a:prstGeom>
+            <a:ln>
+              <a:solidFill>
+                <a:srgbClr val="000000"/>
+              </a:solidFill>
+              <a:tailEnd type="arrow"/>
+            </a:ln>
+          </p:spPr>
+          <p:style>
+            <a:lnRef idx="2">
+              <a:schemeClr val="accent1"/>
+            </a:lnRef>
+            <a:fillRef idx="0">
+              <a:schemeClr val="accent1"/>
+            </a:fillRef>
+            <a:effectRef idx="1">
+              <a:schemeClr val="accent1"/>
+            </a:effectRef>
+            <a:fontRef idx="minor">
+              <a:schemeClr val="tx1"/>
+            </a:fontRef>
+          </p:style>
+        </p:cxnSp>
+      </p:grpSp>
+      <p:sp>
+        <p:nvSpPr>
+          <p:cNvPr id="4" name="Slide Number Placeholder 3"/>
+          <p:cNvSpPr>
+            <a:spLocks noGrp="1"/>
+          </p:cNvSpPr>
+          <p:nvPr>
+            <p:ph type="sldNum" sz="quarter" idx="4294967295"/>
+          </p:nvPr>
+        </p:nvSpPr>
+        <p:spPr>
+          <a:xfrm>
+            <a:off x="8237538" y="6553200"/>
+            <a:ext cx="906462" cy="457200"/>
+          </a:xfrm>
+          <a:prstGeom prst="rect">
+            <a:avLst/>
+          </a:prstGeom>
+        </p:spPr>
+        <p:txBody>
+          <a:bodyPr/>
+          <a:lstStyle/>
+          <a:p>
+            <a:fld id="{0D854ACF-EFF3-42D3-AB5F-408268493A1F}" type="slidenum">
+              <a:rPr lang="en-US" smtClean="0"/>
+              <a:pPr/>
+              <a:t>8</a:t>
+            </a:fld>
+            <a:endParaRPr lang="en-US" dirty="0"/>
+          </a:p>
+        </p:txBody>
+      </p:sp>
+    </p:spTree>
+    <p:extLst>
+      <p:ext uri="{BB962C8B-B14F-4D97-AF65-F5344CB8AC3E}">
+        <p14:creationId xmlns:p14="http://schemas.microsoft.com/office/powerpoint/2010/main" val="424490968"/>
+      </p:ext>
+    </p:extLst>
+  </p:cSld>
+  <p:clrMapOvr>
+    <a:masterClrMapping/>
+  </p:clrMapOvr>
+  <mc:AlternateContent xmlns:mc="http://schemas.openxmlformats.org/markup-compatibility/2006">
+    <mc:Choice xmlns:p14="http://schemas.microsoft.com/office/powerpoint/2010/main" Requires="p14">
+      <p:transition p14:dur="10"/>
+    </mc:Choice>
+    <mc:Fallback>
+      <p:transition/>
+    </mc:Fallback>
+  </mc:AlternateContent>
+  <p:timing>
+    <p:tnLst>
+      <p:par>
+        <p:cTn id="1" dur="indefinite" restart="never" nodeType="tmRoot"/>
+      </p:par>
+    </p:tnLst>
+  </p:timing>
+</p:sld>
+</file>
+
+<file path=ppt/slides/slide9.xml><?xml version="1.0" encoding="utf-8"?>
+<p:sld xmlns:a="http://schemas.openxmlformats.org/drawingml/2006/main" xmlns:r="http://schemas.openxmlformats.org/officeDocument/2006/relationships" xmlns:p="http://schemas.openxmlformats.org/presentationml/2006/main">
+  <p:cSld>
+    <p:spTree>
+      <p:nvGrpSpPr>
+        <p:cNvPr id="1" name=""/>
+        <p:cNvGrpSpPr/>
+        <p:nvPr/>
+      </p:nvGrpSpPr>
+      <p:grpSpPr>
+        <a:xfrm>
+          <a:off x="0" y="0"/>
+          <a:ext cx="0" cy="0"/>
+          <a:chOff x="0" y="0"/>
+          <a:chExt cx="0" cy="0"/>
+        </a:xfrm>
+      </p:grpSpPr>
+      <p:sp>
+        <p:nvSpPr>
           <p:cNvPr id="7170" name="Title 1"/>
           <p:cNvSpPr>
             <a:spLocks noGrp="1"/>
@@ -13480,7 +14237,7 @@
               <a:pPr>
                 <a:defRPr/>
               </a:pPr>
-              <a:t>8</a:t>
+              <a:t>9</a:t>
             </a:fld>
             <a:endParaRPr lang="en-US"/>
           </a:p>
@@ -14251,12 +15008,20 @@
             <a:p>
               <a:pPr algn="ctr"/>
               <a:r>
+                <a:rPr lang="en-US" sz="1200" b="1" dirty="0" err="1" smtClean="0">
+                  <a:solidFill>
+                    <a:srgbClr val="FF0000"/>
+                  </a:solidFill>
+                </a:rPr>
+                <a:t>pay</a:t>
+              </a:r>
+              <a:r>
                 <a:rPr lang="en-US" sz="1200" dirty="0" err="1" smtClean="0">
                   <a:solidFill>
                     <a:srgbClr val="000000"/>
                   </a:solidFill>
                 </a:rPr>
-                <a:t>pay.js</a:t>
+                <a:t>.js</a:t>
               </a:r>
               <a:endParaRPr lang="en-US" sz="1200" dirty="0">
                 <a:solidFill>
@@ -15555,775 +16320,6 @@
     <p:extLst>
       <p:ext uri="{BB962C8B-B14F-4D97-AF65-F5344CB8AC3E}">
         <p14:creationId xmlns:p14="http://schemas.microsoft.com/office/powerpoint/2010/main" val="1620142088"/>
-      </p:ext>
-    </p:extLst>
-  </p:cSld>
-  <p:clrMapOvr>
-    <a:masterClrMapping/>
-  </p:clrMapOvr>
-  <mc:AlternateContent xmlns:mc="http://schemas.openxmlformats.org/markup-compatibility/2006" xmlns:p14="http://schemas.microsoft.com/office/powerpoint/2010/main">
-    <mc:Choice Requires="p14">
-      <p:transition p14:dur="0"/>
-    </mc:Choice>
-    <mc:Fallback xmlns="">
-      <p:transition/>
-    </mc:Fallback>
-  </mc:AlternateContent>
-  <p:timing>
-    <p:tnLst>
-      <p:par>
-        <p:cTn id="1" dur="indefinite" restart="never" nodeType="tmRoot"/>
-      </p:par>
-    </p:tnLst>
-  </p:timing>
-</p:sld>
-</file>
-
-<file path=ppt/slides/slide9.xml><?xml version="1.0" encoding="utf-8"?>
-<p:sld xmlns:a="http://schemas.openxmlformats.org/drawingml/2006/main" xmlns:r="http://schemas.openxmlformats.org/officeDocument/2006/relationships" xmlns:p="http://schemas.openxmlformats.org/presentationml/2006/main">
-  <p:cSld>
-    <p:spTree>
-      <p:nvGrpSpPr>
-        <p:cNvPr id="1" name=""/>
-        <p:cNvGrpSpPr/>
-        <p:nvPr/>
-      </p:nvGrpSpPr>
-      <p:grpSpPr>
-        <a:xfrm>
-          <a:off x="0" y="0"/>
-          <a:ext cx="0" cy="0"/>
-          <a:chOff x="0" y="0"/>
-          <a:chExt cx="0" cy="0"/>
-        </a:xfrm>
-      </p:grpSpPr>
-      <p:sp>
-        <p:nvSpPr>
-          <p:cNvPr id="2" name="Title 1"/>
-          <p:cNvSpPr>
-            <a:spLocks noGrp="1"/>
-          </p:cNvSpPr>
-          <p:nvPr>
-            <p:ph type="title"/>
-          </p:nvPr>
-        </p:nvSpPr>
-        <p:spPr/>
-        <p:txBody>
-          <a:bodyPr/>
-          <a:lstStyle/>
-          <a:p>
-            <a:r>
-              <a:rPr lang="en-US" dirty="0" smtClean="0"/>
-              <a:t>Overview: Request Flow</a:t>
-            </a:r>
-            <a:endParaRPr lang="en-US" dirty="0"/>
-          </a:p>
-        </p:txBody>
-      </p:sp>
-      <p:grpSp>
-        <p:nvGrpSpPr>
-          <p:cNvPr id="5" name="Group 2"/>
-          <p:cNvGrpSpPr/>
-          <p:nvPr/>
-        </p:nvGrpSpPr>
-        <p:grpSpPr>
-          <a:xfrm>
-            <a:off x="685800" y="1524000"/>
-            <a:ext cx="7321787" cy="4384035"/>
-            <a:chOff x="399102" y="319774"/>
-            <a:chExt cx="7816747" cy="4620093"/>
-          </a:xfrm>
-        </p:grpSpPr>
-        <p:sp>
-          <p:nvSpPr>
-            <p:cNvPr id="7" name="Rectangle 5"/>
-            <p:cNvSpPr/>
-            <p:nvPr/>
-          </p:nvSpPr>
-          <p:spPr>
-            <a:xfrm>
-              <a:off x="3421862" y="319774"/>
-              <a:ext cx="1397984" cy="804002"/>
-            </a:xfrm>
-            <a:prstGeom prst="rect">
-              <a:avLst/>
-            </a:prstGeom>
-          </p:spPr>
-          <p:style>
-            <a:lnRef idx="1">
-              <a:schemeClr val="accent1"/>
-            </a:lnRef>
-            <a:fillRef idx="3">
-              <a:schemeClr val="accent1"/>
-            </a:fillRef>
-            <a:effectRef idx="2">
-              <a:schemeClr val="accent1"/>
-            </a:effectRef>
-            <a:fontRef idx="minor">
-              <a:schemeClr val="lt1"/>
-            </a:fontRef>
-          </p:style>
-          <p:txBody>
-            <a:bodyPr rtlCol="0" anchor="ctr"/>
-            <a:lstStyle/>
-            <a:p>
-              <a:pPr algn="ctr"/>
-              <a:r>
-                <a:rPr lang="en-US" dirty="0">
-                  <a:solidFill>
-                    <a:srgbClr val="000000"/>
-                  </a:solidFill>
-                </a:rPr>
-                <a:t>B</a:t>
-              </a:r>
-              <a:r>
-                <a:rPr lang="en-US" dirty="0" smtClean="0">
-                  <a:solidFill>
-                    <a:srgbClr val="000000"/>
-                  </a:solidFill>
-                </a:rPr>
-                <a:t>rowser</a:t>
-              </a:r>
-              <a:endParaRPr lang="en-US" dirty="0">
-                <a:solidFill>
-                  <a:srgbClr val="000000"/>
-                </a:solidFill>
-              </a:endParaRPr>
-            </a:p>
-          </p:txBody>
-        </p:sp>
-        <p:sp>
-          <p:nvSpPr>
-            <p:cNvPr id="8" name="Oval 20"/>
-            <p:cNvSpPr/>
-            <p:nvPr/>
-          </p:nvSpPr>
-          <p:spPr>
-            <a:xfrm>
-              <a:off x="3225413" y="1909505"/>
-              <a:ext cx="1790881" cy="1352185"/>
-            </a:xfrm>
-            <a:prstGeom prst="ellipse">
-              <a:avLst/>
-            </a:prstGeom>
-          </p:spPr>
-          <p:style>
-            <a:lnRef idx="1">
-              <a:schemeClr val="accent1"/>
-            </a:lnRef>
-            <a:fillRef idx="3">
-              <a:schemeClr val="accent1"/>
-            </a:fillRef>
-            <a:effectRef idx="2">
-              <a:schemeClr val="accent1"/>
-            </a:effectRef>
-            <a:fontRef idx="minor">
-              <a:schemeClr val="lt1"/>
-            </a:fontRef>
-          </p:style>
-          <p:txBody>
-            <a:bodyPr rtlCol="0" anchor="ctr"/>
-            <a:lstStyle/>
-            <a:p>
-              <a:pPr algn="ctr"/>
-              <a:r>
-                <a:rPr lang="en-US" dirty="0" smtClean="0">
-                  <a:solidFill>
-                    <a:srgbClr val="000000"/>
-                  </a:solidFill>
-                </a:rPr>
-                <a:t>Node/Express</a:t>
-              </a:r>
-              <a:endParaRPr lang="en-US" dirty="0">
-                <a:solidFill>
-                  <a:srgbClr val="000000"/>
-                </a:solidFill>
-              </a:endParaRPr>
-            </a:p>
-          </p:txBody>
-        </p:sp>
-        <p:sp>
-          <p:nvSpPr>
-            <p:cNvPr id="9" name="Rectangle 21"/>
-            <p:cNvSpPr/>
-            <p:nvPr/>
-          </p:nvSpPr>
-          <p:spPr>
-            <a:xfrm>
-              <a:off x="399102" y="4135865"/>
-              <a:ext cx="1397984" cy="804002"/>
-            </a:xfrm>
-            <a:prstGeom prst="rect">
-              <a:avLst/>
-            </a:prstGeom>
-          </p:spPr>
-          <p:style>
-            <a:lnRef idx="1">
-              <a:schemeClr val="accent1"/>
-            </a:lnRef>
-            <a:fillRef idx="3">
-              <a:schemeClr val="accent1"/>
-            </a:fillRef>
-            <a:effectRef idx="2">
-              <a:schemeClr val="accent1"/>
-            </a:effectRef>
-            <a:fontRef idx="minor">
-              <a:schemeClr val="lt1"/>
-            </a:fontRef>
-          </p:style>
-          <p:txBody>
-            <a:bodyPr rtlCol="0" anchor="ctr"/>
-            <a:lstStyle/>
-            <a:p>
-              <a:pPr algn="ctr"/>
-              <a:r>
-                <a:rPr lang="en-US" sz="1400" dirty="0" smtClean="0">
-                  <a:solidFill>
-                    <a:srgbClr val="000000"/>
-                  </a:solidFill>
-                </a:rPr>
-                <a:t>/controllers/</a:t>
-              </a:r>
-            </a:p>
-            <a:p>
-              <a:pPr algn="ctr"/>
-              <a:r>
-                <a:rPr lang="en-US" sz="1400" dirty="0" smtClean="0">
-                  <a:solidFill>
-                    <a:srgbClr val="FF0000"/>
-                  </a:solidFill>
-                </a:rPr>
-                <a:t>pay</a:t>
-              </a:r>
-              <a:r>
-                <a:rPr lang="en-US" sz="1400" dirty="0" smtClean="0">
-                  <a:solidFill>
-                    <a:srgbClr val="000000"/>
-                  </a:solidFill>
-                </a:rPr>
-                <a:t>/</a:t>
-              </a:r>
-              <a:r>
-                <a:rPr lang="en-US" sz="1400" dirty="0" err="1" smtClean="0">
-                  <a:solidFill>
-                    <a:srgbClr val="000000"/>
-                  </a:solidFill>
-                </a:rPr>
-                <a:t>index.js</a:t>
-              </a:r>
-              <a:endParaRPr lang="en-US" sz="1400" dirty="0">
-                <a:solidFill>
-                  <a:srgbClr val="000000"/>
-                </a:solidFill>
-              </a:endParaRPr>
-            </a:p>
-          </p:txBody>
-        </p:sp>
-        <p:sp>
-          <p:nvSpPr>
-            <p:cNvPr id="10" name="Rectangle 22"/>
-            <p:cNvSpPr/>
-            <p:nvPr/>
-          </p:nvSpPr>
-          <p:spPr>
-            <a:xfrm>
-              <a:off x="3487682" y="3899807"/>
-              <a:ext cx="1397984" cy="804002"/>
-            </a:xfrm>
-            <a:prstGeom prst="rect">
-              <a:avLst/>
-            </a:prstGeom>
-          </p:spPr>
-          <p:style>
-            <a:lnRef idx="1">
-              <a:schemeClr val="accent1"/>
-            </a:lnRef>
-            <a:fillRef idx="3">
-              <a:schemeClr val="accent1"/>
-            </a:fillRef>
-            <a:effectRef idx="2">
-              <a:schemeClr val="accent1"/>
-            </a:effectRef>
-            <a:fontRef idx="minor">
-              <a:schemeClr val="lt1"/>
-            </a:fontRef>
-          </p:style>
-          <p:txBody>
-            <a:bodyPr rtlCol="0" anchor="ctr"/>
-            <a:lstStyle/>
-            <a:p>
-              <a:pPr algn="ctr"/>
-              <a:r>
-                <a:rPr lang="en-US" sz="1400" dirty="0" smtClean="0">
-                  <a:solidFill>
-                    <a:srgbClr val="000000"/>
-                  </a:solidFill>
-                </a:rPr>
-                <a:t>/models/</a:t>
-              </a:r>
-            </a:p>
-            <a:p>
-              <a:pPr algn="ctr"/>
-              <a:r>
-                <a:rPr lang="en-US" sz="1400" dirty="0" err="1" smtClean="0">
-                  <a:solidFill>
-                    <a:srgbClr val="FF0000"/>
-                  </a:solidFill>
-                </a:rPr>
-                <a:t>pay</a:t>
-              </a:r>
-              <a:r>
-                <a:rPr lang="en-US" sz="1400" dirty="0" err="1" smtClean="0">
-                  <a:solidFill>
-                    <a:srgbClr val="000000"/>
-                  </a:solidFill>
-                </a:rPr>
-                <a:t>.js</a:t>
-              </a:r>
-              <a:endParaRPr lang="en-US" sz="1400" dirty="0">
-                <a:solidFill>
-                  <a:srgbClr val="000000"/>
-                </a:solidFill>
-              </a:endParaRPr>
-            </a:p>
-          </p:txBody>
-        </p:sp>
-        <p:sp>
-          <p:nvSpPr>
-            <p:cNvPr id="24" name="Rectangle 23"/>
-            <p:cNvSpPr/>
-            <p:nvPr/>
-          </p:nvSpPr>
-          <p:spPr>
-            <a:xfrm>
-              <a:off x="6690028" y="4135865"/>
-              <a:ext cx="1525821" cy="804002"/>
-            </a:xfrm>
-            <a:prstGeom prst="rect">
-              <a:avLst/>
-            </a:prstGeom>
-          </p:spPr>
-          <p:style>
-            <a:lnRef idx="1">
-              <a:schemeClr val="accent1"/>
-            </a:lnRef>
-            <a:fillRef idx="3">
-              <a:schemeClr val="accent1"/>
-            </a:fillRef>
-            <a:effectRef idx="2">
-              <a:schemeClr val="accent1"/>
-            </a:effectRef>
-            <a:fontRef idx="minor">
-              <a:schemeClr val="lt1"/>
-            </a:fontRef>
-          </p:style>
-          <p:txBody>
-            <a:bodyPr rtlCol="0" anchor="ctr"/>
-            <a:lstStyle/>
-            <a:p>
-              <a:pPr algn="ctr"/>
-              <a:r>
-                <a:rPr lang="en-US" sz="1400" dirty="0" smtClean="0">
-                  <a:solidFill>
-                    <a:srgbClr val="000000"/>
-                  </a:solidFill>
-                </a:rPr>
-                <a:t>/public/template/</a:t>
-              </a:r>
-            </a:p>
-            <a:p>
-              <a:pPr algn="ctr"/>
-              <a:r>
-                <a:rPr lang="en-US" sz="1400" dirty="0" smtClean="0">
-                  <a:solidFill>
-                    <a:srgbClr val="FF0000"/>
-                  </a:solidFill>
-                </a:rPr>
-                <a:t>pay</a:t>
-              </a:r>
-              <a:r>
-                <a:rPr lang="en-US" sz="1400" dirty="0" smtClean="0">
-                  <a:solidFill>
-                    <a:srgbClr val="000000"/>
-                  </a:solidFill>
-                </a:rPr>
-                <a:t>/</a:t>
-              </a:r>
-              <a:r>
-                <a:rPr lang="en-US" sz="1400" dirty="0" err="1" smtClean="0">
-                  <a:solidFill>
-                    <a:srgbClr val="000000"/>
-                  </a:solidFill>
-                </a:rPr>
-                <a:t>index.dust</a:t>
-              </a:r>
-              <a:endParaRPr lang="en-US" sz="1400" dirty="0">
-                <a:solidFill>
-                  <a:srgbClr val="000000"/>
-                </a:solidFill>
-              </a:endParaRPr>
-            </a:p>
-          </p:txBody>
-        </p:sp>
-        <p:cxnSp>
-          <p:nvCxnSpPr>
-            <p:cNvPr id="12" name="Straight Arrow Connector 24"/>
-            <p:cNvCxnSpPr>
-              <a:stCxn id="8" idx="2"/>
-              <a:endCxn id="9" idx="0"/>
-            </p:cNvCxnSpPr>
-            <p:nvPr/>
-          </p:nvCxnSpPr>
-          <p:spPr>
-            <a:xfrm flipH="1">
-              <a:off x="1098095" y="2585597"/>
-              <a:ext cx="2127319" cy="1550267"/>
-            </a:xfrm>
-            <a:prstGeom prst="straightConnector1">
-              <a:avLst/>
-            </a:prstGeom>
-            <a:ln>
-              <a:solidFill>
-                <a:srgbClr val="000000"/>
-              </a:solidFill>
-              <a:tailEnd type="arrow"/>
-            </a:ln>
-          </p:spPr>
-          <p:style>
-            <a:lnRef idx="2">
-              <a:schemeClr val="accent1"/>
-            </a:lnRef>
-            <a:fillRef idx="0">
-              <a:schemeClr val="accent1"/>
-            </a:fillRef>
-            <a:effectRef idx="1">
-              <a:schemeClr val="accent1"/>
-            </a:effectRef>
-            <a:fontRef idx="minor">
-              <a:schemeClr val="tx1"/>
-            </a:fontRef>
-          </p:style>
-        </p:cxnSp>
-        <p:cxnSp>
-          <p:nvCxnSpPr>
-            <p:cNvPr id="13" name="Straight Arrow Connector 25"/>
-            <p:cNvCxnSpPr>
-              <a:stCxn id="24" idx="0"/>
-              <a:endCxn id="8" idx="6"/>
-            </p:cNvCxnSpPr>
-            <p:nvPr/>
-          </p:nvCxnSpPr>
-          <p:spPr>
-            <a:xfrm flipH="1" flipV="1">
-              <a:off x="5016295" y="2585599"/>
-              <a:ext cx="2436644" cy="1550266"/>
-            </a:xfrm>
-            <a:prstGeom prst="straightConnector1">
-              <a:avLst/>
-            </a:prstGeom>
-            <a:ln>
-              <a:solidFill>
-                <a:srgbClr val="000000"/>
-              </a:solidFill>
-              <a:tailEnd type="arrow"/>
-            </a:ln>
-          </p:spPr>
-          <p:style>
-            <a:lnRef idx="2">
-              <a:schemeClr val="accent1"/>
-            </a:lnRef>
-            <a:fillRef idx="0">
-              <a:schemeClr val="accent1"/>
-            </a:fillRef>
-            <a:effectRef idx="1">
-              <a:schemeClr val="accent1"/>
-            </a:effectRef>
-            <a:fontRef idx="minor">
-              <a:schemeClr val="tx1"/>
-            </a:fontRef>
-          </p:style>
-        </p:cxnSp>
-        <p:cxnSp>
-          <p:nvCxnSpPr>
-            <p:cNvPr id="14" name="Straight Arrow Connector 26"/>
-            <p:cNvCxnSpPr>
-              <a:stCxn id="7" idx="2"/>
-              <a:endCxn id="8" idx="0"/>
-            </p:cNvCxnSpPr>
-            <p:nvPr/>
-          </p:nvCxnSpPr>
-          <p:spPr>
-            <a:xfrm>
-              <a:off x="4120854" y="1123777"/>
-              <a:ext cx="0" cy="785729"/>
-            </a:xfrm>
-            <a:prstGeom prst="straightConnector1">
-              <a:avLst/>
-            </a:prstGeom>
-            <a:ln>
-              <a:solidFill>
-                <a:srgbClr val="000000"/>
-              </a:solidFill>
-              <a:tailEnd type="arrow"/>
-            </a:ln>
-          </p:spPr>
-          <p:style>
-            <a:lnRef idx="2">
-              <a:schemeClr val="accent1"/>
-            </a:lnRef>
-            <a:fillRef idx="0">
-              <a:schemeClr val="accent1"/>
-            </a:fillRef>
-            <a:effectRef idx="1">
-              <a:schemeClr val="accent1"/>
-            </a:effectRef>
-            <a:fontRef idx="minor">
-              <a:schemeClr val="tx1"/>
-            </a:fontRef>
-          </p:style>
-        </p:cxnSp>
-        <p:sp>
-          <p:nvSpPr>
-            <p:cNvPr id="15" name="TextBox 27"/>
-            <p:cNvSpPr txBox="1"/>
-            <p:nvPr/>
-          </p:nvSpPr>
-          <p:spPr>
-            <a:xfrm>
-              <a:off x="538801" y="3585871"/>
-              <a:ext cx="932280" cy="324349"/>
-            </a:xfrm>
-            <a:prstGeom prst="rect">
-              <a:avLst/>
-            </a:prstGeom>
-            <a:noFill/>
-          </p:spPr>
-          <p:txBody>
-            <a:bodyPr wrap="square" rtlCol="0">
-              <a:spAutoFit/>
-            </a:bodyPr>
-            <a:lstStyle/>
-            <a:p>
-              <a:r>
-                <a:rPr lang="en-US" sz="1400" dirty="0" smtClean="0"/>
-                <a:t>invokes</a:t>
-              </a:r>
-              <a:endParaRPr lang="en-US" sz="1400" dirty="0"/>
-            </a:p>
-          </p:txBody>
-        </p:sp>
-        <p:sp>
-          <p:nvSpPr>
-            <p:cNvPr id="16" name="TextBox 28"/>
-            <p:cNvSpPr txBox="1"/>
-            <p:nvPr/>
-          </p:nvSpPr>
-          <p:spPr>
-            <a:xfrm>
-              <a:off x="2011779" y="3981976"/>
-              <a:ext cx="1305004" cy="324349"/>
-            </a:xfrm>
-            <a:prstGeom prst="rect">
-              <a:avLst/>
-            </a:prstGeom>
-            <a:noFill/>
-          </p:spPr>
-          <p:txBody>
-            <a:bodyPr wrap="square" rtlCol="0">
-              <a:spAutoFit/>
-            </a:bodyPr>
-            <a:lstStyle/>
-            <a:p>
-              <a:r>
-                <a:rPr lang="en-US" sz="1400" dirty="0" smtClean="0"/>
-                <a:t>manipulates</a:t>
-              </a:r>
-              <a:endParaRPr lang="en-US" sz="1400" dirty="0"/>
-            </a:p>
-          </p:txBody>
-        </p:sp>
-        <p:sp>
-          <p:nvSpPr>
-            <p:cNvPr id="17" name="TextBox 29"/>
-            <p:cNvSpPr txBox="1"/>
-            <p:nvPr/>
-          </p:nvSpPr>
-          <p:spPr>
-            <a:xfrm>
-              <a:off x="5280174" y="4415226"/>
-              <a:ext cx="1066396" cy="324349"/>
-            </a:xfrm>
-            <a:prstGeom prst="rect">
-              <a:avLst/>
-            </a:prstGeom>
-            <a:noFill/>
-          </p:spPr>
-          <p:txBody>
-            <a:bodyPr wrap="square" rtlCol="0">
-              <a:spAutoFit/>
-            </a:bodyPr>
-            <a:lstStyle/>
-            <a:p>
-              <a:r>
-                <a:rPr lang="en-US" sz="1400" dirty="0" smtClean="0"/>
-                <a:t>renders</a:t>
-              </a:r>
-              <a:endParaRPr lang="en-US" sz="1400" dirty="0"/>
-            </a:p>
-          </p:txBody>
-        </p:sp>
-        <p:cxnSp>
-          <p:nvCxnSpPr>
-            <p:cNvPr id="18" name="Straight Arrow Connector 30"/>
-            <p:cNvCxnSpPr>
-              <a:endCxn id="10" idx="1"/>
-            </p:cNvCxnSpPr>
-            <p:nvPr/>
-          </p:nvCxnSpPr>
-          <p:spPr>
-            <a:xfrm>
-              <a:off x="1797086" y="4289753"/>
-              <a:ext cx="1690596" cy="12056"/>
-            </a:xfrm>
-            <a:prstGeom prst="straightConnector1">
-              <a:avLst/>
-            </a:prstGeom>
-            <a:ln>
-              <a:solidFill>
-                <a:srgbClr val="000000"/>
-              </a:solidFill>
-              <a:tailEnd type="arrow"/>
-            </a:ln>
-          </p:spPr>
-          <p:style>
-            <a:lnRef idx="2">
-              <a:schemeClr val="accent1"/>
-            </a:lnRef>
-            <a:fillRef idx="0">
-              <a:schemeClr val="accent1"/>
-            </a:fillRef>
-            <a:effectRef idx="1">
-              <a:schemeClr val="accent1"/>
-            </a:effectRef>
-            <a:fontRef idx="minor">
-              <a:schemeClr val="tx1"/>
-            </a:fontRef>
-          </p:style>
-        </p:cxnSp>
-        <p:sp>
-          <p:nvSpPr>
-            <p:cNvPr id="19" name="TextBox 31"/>
-            <p:cNvSpPr txBox="1"/>
-            <p:nvPr/>
-          </p:nvSpPr>
-          <p:spPr>
-            <a:xfrm>
-              <a:off x="4139125" y="1335342"/>
-              <a:ext cx="4076723" cy="324349"/>
-            </a:xfrm>
-            <a:prstGeom prst="rect">
-              <a:avLst/>
-            </a:prstGeom>
-            <a:noFill/>
-          </p:spPr>
-          <p:txBody>
-            <a:bodyPr wrap="square" rtlCol="0">
-              <a:spAutoFit/>
-            </a:bodyPr>
-            <a:lstStyle/>
-            <a:p>
-              <a:r>
-                <a:rPr lang="en-US" sz="1400" dirty="0" smtClean="0"/>
-                <a:t>http://localhost:8000/</a:t>
-              </a:r>
-              <a:r>
-                <a:rPr lang="en-US" sz="1400" dirty="0" smtClean="0">
-                  <a:solidFill>
-                    <a:srgbClr val="FF0000"/>
-                  </a:solidFill>
-                </a:rPr>
-                <a:t>pay</a:t>
-              </a:r>
-              <a:r>
-                <a:rPr lang="en-US" sz="1400" dirty="0" smtClean="0"/>
-                <a:t>?amt=100&amp;acct=293 </a:t>
-              </a:r>
-              <a:endParaRPr lang="en-US" sz="1400" dirty="0"/>
-            </a:p>
-          </p:txBody>
-        </p:sp>
-        <p:cxnSp>
-          <p:nvCxnSpPr>
-            <p:cNvPr id="20" name="Straight Arrow Connector 32"/>
-            <p:cNvCxnSpPr/>
-            <p:nvPr/>
-          </p:nvCxnSpPr>
-          <p:spPr>
-            <a:xfrm>
-              <a:off x="1797086" y="4798472"/>
-              <a:ext cx="4892942" cy="12055"/>
-            </a:xfrm>
-            <a:prstGeom prst="straightConnector1">
-              <a:avLst/>
-            </a:prstGeom>
-            <a:ln>
-              <a:solidFill>
-                <a:srgbClr val="000000"/>
-              </a:solidFill>
-              <a:tailEnd type="arrow"/>
-            </a:ln>
-          </p:spPr>
-          <p:style>
-            <a:lnRef idx="2">
-              <a:schemeClr val="accent1"/>
-            </a:lnRef>
-            <a:fillRef idx="0">
-              <a:schemeClr val="accent1"/>
-            </a:fillRef>
-            <a:effectRef idx="1">
-              <a:schemeClr val="accent1"/>
-            </a:effectRef>
-            <a:fontRef idx="minor">
-              <a:schemeClr val="tx1"/>
-            </a:fontRef>
-          </p:style>
-        </p:cxnSp>
-      </p:grpSp>
-      <p:sp>
-        <p:nvSpPr>
-          <p:cNvPr id="4" name="Slide Number Placeholder 3"/>
-          <p:cNvSpPr>
-            <a:spLocks noGrp="1"/>
-          </p:cNvSpPr>
-          <p:nvPr>
-            <p:ph type="sldNum" sz="quarter" idx="4294967295"/>
-          </p:nvPr>
-        </p:nvSpPr>
-        <p:spPr>
-          <a:xfrm>
-            <a:off x="8237538" y="6553200"/>
-            <a:ext cx="906462" cy="457200"/>
-          </a:xfrm>
-          <a:prstGeom prst="rect">
-            <a:avLst/>
-          </a:prstGeom>
-        </p:spPr>
-        <p:txBody>
-          <a:bodyPr/>
-          <a:lstStyle/>
-          <a:p>
-            <a:fld id="{0D854ACF-EFF3-42D3-AB5F-408268493A1F}" type="slidenum">
-              <a:rPr lang="en-US" smtClean="0"/>
-              <a:pPr/>
-              <a:t>9</a:t>
-            </a:fld>
-            <a:endParaRPr lang="en-US" dirty="0"/>
-          </a:p>
-        </p:txBody>
-      </p:sp>
-    </p:spTree>
-    <p:extLst>
-      <p:ext uri="{BB962C8B-B14F-4D97-AF65-F5344CB8AC3E}">
-        <p14:creationId xmlns:p14="http://schemas.microsoft.com/office/powerpoint/2010/main" val="424490968"/>
       </p:ext>
     </p:extLst>
   </p:cSld>

</xml_diff>

<commit_message>
Updated the kraken section ppt and labs
</commit_message>
<xml_diff>
--- a/node/lesson-80-kraken/kraken.pptx
+++ b/node/lesson-80-kraken/kraken.pptx
@@ -9903,16 +9903,7 @@
                 </a:solidFill>
                 <a:latin typeface="Monaco"/>
               </a:rPr>
-              <a:t>)</a:t>
-            </a:r>
-            <a:r>
-              <a:rPr lang="fr-FR" sz="1600" dirty="0" smtClean="0">
-                <a:solidFill>
-                  <a:srgbClr val="000000"/>
-                </a:solidFill>
-                <a:latin typeface="Monaco"/>
-              </a:rPr>
-              <a:t>;</a:t>
+              <a:t>);</a:t>
             </a:r>
             <a:br>
               <a:rPr lang="fr-FR" sz="1600" dirty="0" smtClean="0">
@@ -10110,12 +10101,24 @@
               <a:t>No </a:t>
             </a:r>
             <a:r>
-              <a:rPr lang="fr-FR" dirty="0" err="1" smtClean="0"/>
+              <a:rPr lang="fr-FR" dirty="0" err="1" smtClean="0">
+                <a:solidFill>
+                  <a:srgbClr val="FF0000"/>
+                </a:solidFill>
+              </a:rPr>
               <a:t>path</a:t>
             </a:r>
             <a:r>
+              <a:rPr lang="fr-FR" dirty="0" smtClean="0">
+                <a:solidFill>
+                  <a:srgbClr val="FF0000"/>
+                </a:solidFill>
+              </a:rPr>
+              <a:t> </a:t>
+            </a:r>
+            <a:r>
               <a:rPr lang="fr-FR" dirty="0" smtClean="0"/>
-              <a:t> information </a:t>
+              <a:t>information </a:t>
             </a:r>
             <a:r>
               <a:rPr lang="fr-FR" dirty="0" err="1" smtClean="0"/>
@@ -10147,7 +10150,25 @@
             </a:r>
             <a:r>
               <a:rPr lang="fr-FR" dirty="0" smtClean="0"/>
-              <a:t> option</a:t>
+              <a:t> </a:t>
+            </a:r>
+            <a:r>
+              <a:rPr lang="fr-FR" dirty="0" smtClean="0"/>
+              <a:t>option</a:t>
+            </a:r>
+          </a:p>
+          <a:p>
+            <a:r>
+              <a:rPr lang="fr-FR" dirty="0" smtClean="0"/>
+              <a:t>This </a:t>
+            </a:r>
+            <a:r>
+              <a:rPr lang="fr-FR" dirty="0" err="1" smtClean="0"/>
+              <a:t>is</a:t>
+            </a:r>
+            <a:r>
+              <a:rPr lang="fr-FR" dirty="0" smtClean="0"/>
+              <a:t> the default Express option.</a:t>
             </a:r>
             <a:endParaRPr lang="fr-FR" dirty="0"/>
           </a:p>
@@ -11300,16 +11321,8 @@
               <a:t>content strings, </a:t>
             </a:r>
             <a:r>
-              <a:rPr lang="en-US" dirty="0" err="1"/>
-              <a:t>inlined</a:t>
-            </a:r>
-            <a:r>
-              <a:rPr lang="en-US" dirty="0"/>
-              <a:t> </a:t>
-            </a:r>
-            <a:r>
-              <a:rPr lang="en-US" dirty="0" smtClean="0"/>
-              <a:t>from </a:t>
+              <a:rPr lang="en-US" dirty="0" smtClean="0"/>
+              <a:t>extracted from </a:t>
             </a:r>
             <a:r>
               <a:rPr lang="en-US" dirty="0"/>
@@ -11687,21 +11700,7 @@
                 <a:latin typeface="Monaco"/>
                 <a:cs typeface="Monaco"/>
               </a:rPr>
-              <a:t>/</a:t>
-            </a:r>
-            <a:r>
-              <a:rPr lang="en-US" sz="1600" dirty="0" smtClean="0">
-                <a:latin typeface="Monaco"/>
-                <a:cs typeface="Monaco"/>
-              </a:rPr>
-              <a:t>&lt;view&gt;</a:t>
-            </a:r>
-            <a:r>
-              <a:rPr lang="en-US" sz="1600" dirty="0" smtClean="0">
-                <a:latin typeface="Monaco"/>
-                <a:cs typeface="Monaco"/>
-              </a:rPr>
-              <a:t>.properties</a:t>
+              <a:t>/&lt;view&gt;.properties</a:t>
             </a:r>
             <a:endParaRPr lang="en-US" sz="1600" dirty="0">
               <a:latin typeface="Monaco"/>
@@ -11736,26 +11735,8 @@
                 <a:latin typeface="Monaco"/>
                 <a:cs typeface="Monaco"/>
               </a:rPr>
-              <a:t>/</a:t>
-            </a:r>
-            <a:r>
-              <a:rPr lang="en-US" sz="1600" dirty="0" smtClean="0">
-                <a:latin typeface="Monaco"/>
-                <a:cs typeface="Monaco"/>
-              </a:rPr>
-              <a:t>&lt;view&gt;</a:t>
-            </a:r>
-            <a:r>
-              <a:rPr lang="en-US" sz="1600" dirty="0" smtClean="0">
-                <a:latin typeface="Monaco"/>
-                <a:cs typeface="Monaco"/>
-              </a:rPr>
-              <a:t>.properties</a:t>
-            </a:r>
-            <a:endParaRPr lang="en-US" sz="1600" dirty="0" smtClean="0">
-              <a:latin typeface="Monaco"/>
-              <a:cs typeface="Monaco"/>
-            </a:endParaRPr>
+              <a:t>/&lt;view&gt;.properties</a:t>
+            </a:r>
           </a:p>
           <a:p>
             <a:r>
@@ -11763,14 +11744,7 @@
                 <a:latin typeface="Myriad Pro"/>
                 <a:cs typeface="Myriad Pro"/>
               </a:rPr>
-              <a:t>To </a:t>
-            </a:r>
-            <a:r>
-              <a:rPr lang="en-US" dirty="0" smtClean="0">
-                <a:latin typeface="Myriad Pro"/>
-                <a:cs typeface="Myriad Pro"/>
-              </a:rPr>
-              <a:t>access this </a:t>
+              <a:t>To access this </a:t>
             </a:r>
             <a:r>
               <a:rPr lang="en-US" dirty="0">
@@ -12392,15 +12366,35 @@
           <a:p>
             <a:r>
               <a:rPr lang="en-US" sz="2000" dirty="0"/>
-              <a:t>Localization: Engine-</a:t>
-            </a:r>
-            <a:r>
-              <a:rPr lang="en-US" sz="2000" dirty="0" err="1"/>
+              <a:t>Localization: </a:t>
+            </a:r>
+            <a:r>
+              <a:rPr lang="en-US" sz="2000" dirty="0">
+                <a:solidFill>
+                  <a:srgbClr val="FF0000"/>
+                </a:solidFill>
+              </a:rPr>
+              <a:t>Engine-</a:t>
+            </a:r>
+            <a:r>
+              <a:rPr lang="en-US" sz="2000" dirty="0" err="1">
+                <a:solidFill>
+                  <a:srgbClr val="FF0000"/>
+                </a:solidFill>
+              </a:rPr>
               <a:t>munger</a:t>
             </a:r>
             <a:r>
+              <a:rPr lang="en-US" sz="2000" dirty="0">
+                <a:solidFill>
+                  <a:srgbClr val="FF0000"/>
+                </a:solidFill>
+              </a:rPr>
+              <a:t> </a:t>
+            </a:r>
+            <a:r>
               <a:rPr lang="en-US" sz="2000" dirty="0"/>
-              <a:t> module handles loading content bundles based on request context</a:t>
+              <a:t>module handles loading content bundles based on request context</a:t>
             </a:r>
           </a:p>
         </p:txBody>
@@ -12892,22 +12886,54 @@
             </a:r>
             <a:r>
               <a:rPr lang="en-US" dirty="0" smtClean="0"/>
-              <a:t> – creates a new controller named </a:t>
-            </a:r>
+              <a:t> – creates a new </a:t>
+            </a:r>
+            <a:r>
+              <a:rPr lang="en-US" dirty="0" smtClean="0"/>
+              <a:t>controller, model, I18N properties, view, and test programs </a:t>
+            </a:r>
+            <a:r>
+              <a:rPr lang="en-US" dirty="0" smtClean="0"/>
+              <a:t>named </a:t>
+            </a:r>
+            <a:r>
+              <a:rPr lang="en-US" sz="1600" dirty="0" err="1" smtClean="0">
+                <a:solidFill>
+                  <a:srgbClr val="FF0000"/>
+                </a:solidFill>
+                <a:latin typeface="Monaco"/>
+                <a:cs typeface="Monaco"/>
+              </a:rPr>
+              <a:t>myController</a:t>
+            </a:r>
+            <a:endParaRPr lang="en-US" dirty="0" smtClean="0">
+              <a:solidFill>
+                <a:srgbClr val="FF0000"/>
+              </a:solidFill>
+            </a:endParaRPr>
+          </a:p>
+          <a:p>
+            <a:pPr lvl="1"/>
             <a:r>
               <a:rPr lang="en-US" sz="1600" dirty="0" err="1">
+                <a:solidFill>
+                  <a:srgbClr val="FF0000"/>
+                </a:solidFill>
                 <a:latin typeface="Monaco"/>
                 <a:cs typeface="Monaco"/>
               </a:rPr>
-              <a:t>myController</a:t>
-            </a:r>
-            <a:r>
-              <a:rPr lang="en-US" dirty="0" smtClean="0"/>
-              <a:t> and its dependencies</a:t>
-            </a:r>
-          </a:p>
-          <a:p>
-            <a:pPr lvl="1"/>
+              <a:t>yo</a:t>
+            </a:r>
+            <a:r>
+              <a:rPr lang="en-US" sz="1600" dirty="0">
+                <a:solidFill>
+                  <a:srgbClr val="FF0000"/>
+                </a:solidFill>
+                <a:latin typeface="Monaco"/>
+                <a:cs typeface="Monaco"/>
+              </a:rPr>
+              <a:t> </a:t>
+            </a:r>
             <a:r>
               <a:rPr lang="en-US" sz="1600" dirty="0" err="1">
                 <a:solidFill>
@@ -12916,7 +12942,7 @@
                 <a:latin typeface="Monaco"/>
                 <a:cs typeface="Monaco"/>
               </a:rPr>
-              <a:t>yo</a:t>
+              <a:t>kraken:model</a:t>
             </a:r>
             <a:r>
               <a:rPr lang="en-US" sz="1600" dirty="0">
@@ -12936,48 +12962,34 @@
                 <a:latin typeface="Monaco"/>
                 <a:cs typeface="Monaco"/>
               </a:rPr>
-              <a:t>kraken:model</a:t>
-            </a:r>
-            <a:r>
-              <a:rPr lang="en-US" sz="1600" dirty="0">
+              <a:t>myModel</a:t>
+            </a:r>
+            <a:r>
+              <a:rPr lang="en-US" dirty="0" smtClean="0">
                 <a:solidFill>
                   <a:srgbClr val="FF0000"/>
                 </a:solidFill>
+              </a:rPr>
+              <a:t> </a:t>
+            </a:r>
+            <a:r>
+              <a:rPr lang="en-US" dirty="0" smtClean="0"/>
+              <a:t>– creates a new model named </a:t>
+            </a:r>
+            <a:r>
+              <a:rPr lang="en-US" sz="1600" dirty="0" err="1">
+                <a:solidFill>
+                  <a:srgbClr val="FF0000"/>
+                </a:solidFill>
                 <a:latin typeface="Monaco"/>
                 <a:cs typeface="Monaco"/>
               </a:rPr>
-              <a:t> </a:t>
-            </a:r>
-            <a:r>
-              <a:rPr lang="en-US" sz="1600" dirty="0" err="1">
-                <a:solidFill>
-                  <a:srgbClr val="FF0000"/>
-                </a:solidFill>
-                <a:latin typeface="Monaco"/>
-                <a:cs typeface="Monaco"/>
-              </a:rPr>
               <a:t>myModel</a:t>
             </a:r>
-            <a:r>
-              <a:rPr lang="en-US" dirty="0" smtClean="0">
-                <a:solidFill>
-                  <a:srgbClr val="FF0000"/>
-                </a:solidFill>
-              </a:rPr>
-              <a:t> </a:t>
-            </a:r>
-            <a:r>
-              <a:rPr lang="en-US" dirty="0" smtClean="0"/>
-              <a:t>– creates a new model named </a:t>
-            </a:r>
-            <a:r>
-              <a:rPr lang="en-US" sz="1600" dirty="0" err="1">
-                <a:latin typeface="Monaco"/>
-                <a:cs typeface="Monaco"/>
-              </a:rPr>
-              <a:t>myModel</a:t>
-            </a:r>
             <a:endParaRPr lang="en-US" sz="1600" dirty="0">
+              <a:solidFill>
+                <a:srgbClr val="FF0000"/>
+              </a:solidFill>
               <a:latin typeface="Monaco"/>
               <a:cs typeface="Monaco"/>
             </a:endParaRPr>
@@ -13040,16 +13052,27 @@
             </a:r>
             <a:r>
               <a:rPr lang="en-US" sz="1600" dirty="0" err="1">
+                <a:solidFill>
+                  <a:srgbClr val="FF0000"/>
+                </a:solidFill>
                 <a:latin typeface="Monaco"/>
                 <a:cs typeface="Monaco"/>
               </a:rPr>
               <a:t>myTemplate</a:t>
             </a:r>
             <a:r>
-              <a:rPr lang="en-US" dirty="0" smtClean="0"/>
+              <a:rPr lang="en-US" dirty="0" smtClean="0">
+                <a:solidFill>
+                  <a:srgbClr val="FF0000"/>
+                </a:solidFill>
+              </a:rPr>
               <a:t> </a:t>
             </a:r>
-            <a:endParaRPr lang="en-US" dirty="0"/>
+            <a:endParaRPr lang="en-US" dirty="0">
+              <a:solidFill>
+                <a:srgbClr val="FF0000"/>
+              </a:solidFill>
+            </a:endParaRPr>
           </a:p>
         </p:txBody>
       </p:sp>

</xml_diff>